<commit_message>
Added "job - Historic" page to the printix template
Printix.pbix
- Added a new page that shows "job - Historic"
- Improved relationship model
- Fixed some typs
PrintixPowerBIDesign.pptx
- Added "job - Historic" section
\Images folder
- Updated with the latest PowerPoint design
Readme.md
- Added a warning about refresh time on the public demo solution
</commit_message>
<xml_diff>
--- a/PowerPoint/PrintixPowerBIDesign.pptx
+++ b/PowerPoint/PrintixPowerBIDesign.pptx
@@ -5,7 +5,7 @@
     <p:sldMasterId id="2147483648" r:id="rId1"/>
   </p:sldMasterIdLst>
   <p:notesMasterIdLst>
-    <p:notesMasterId r:id="rId15"/>
+    <p:notesMasterId r:id="rId16"/>
   </p:notesMasterIdLst>
   <p:sldIdLst>
     <p:sldId id="271" r:id="rId2"/>
@@ -18,9 +18,10 @@
     <p:sldId id="283" r:id="rId9"/>
     <p:sldId id="280" r:id="rId10"/>
     <p:sldId id="284" r:id="rId11"/>
-    <p:sldId id="287" r:id="rId12"/>
-    <p:sldId id="285" r:id="rId13"/>
-    <p:sldId id="286" r:id="rId14"/>
+    <p:sldId id="291" r:id="rId12"/>
+    <p:sldId id="287" r:id="rId13"/>
+    <p:sldId id="285" r:id="rId14"/>
+    <p:sldId id="286" r:id="rId15"/>
   </p:sldIdLst>
   <p:sldSz cx="24377650" cy="13716000"/>
   <p:notesSz cx="6858000" cy="9144000"/>
@@ -168,6 +169,11 @@
             <p14:sldId id="284"/>
           </p14:sldIdLst>
         </p14:section>
+        <p14:section name="Job - Historic" id="{5C31E56A-1A1F-4154-A3AD-C4FF5CE203C6}">
+          <p14:sldIdLst>
+            <p14:sldId id="291"/>
+          </p14:sldIdLst>
+        </p14:section>
         <p14:section name="Networks - Overview" id="{EE161948-EF80-4EB0-A0BF-E9657B967DB3}">
           <p14:sldIdLst>
             <p14:sldId id="287"/>
@@ -308,7 +314,7 @@
             <a:fld id="{EFC10EE1-B198-C942-8235-326C972CBB30}" type="datetimeFigureOut">
               <a:rPr lang="en-US" smtClean="0"/>
               <a:pPr/>
-              <a:t>4/29/2018</a:t>
+              <a:t>5/22/2018</a:t>
             </a:fld>
             <a:endParaRPr lang="en-US" dirty="0"/>
           </a:p>
@@ -2043,12 +2049,12 @@
           </a:ln>
           <a:extLst>
             <a:ext uri="{909E8E84-426E-40dd-AFC4-6F175D3DCCD1}">
-              <a14:hiddenFill xmlns:a14="http://schemas.microsoft.com/office/drawing/2010/main" xmlns="">
+              <a14:hiddenFill xmlns="" xmlns:a14="http://schemas.microsoft.com/office/drawing/2010/main">
                 <a:noFill/>
               </a14:hiddenFill>
             </a:ext>
             <a:ext uri="{91240B29-F687-4f45-9708-019B960494DF}">
-              <a14:hiddenLine xmlns:a14="http://schemas.microsoft.com/office/drawing/2010/main" xmlns="" w="9525">
+              <a14:hiddenLine xmlns="" xmlns:a14="http://schemas.microsoft.com/office/drawing/2010/main" w="9525">
                 <a:solidFill>
                   <a:srgbClr val="000000"/>
                 </a:solidFill>
@@ -2093,12 +2099,12 @@
           </a:ln>
           <a:extLst>
             <a:ext uri="{909E8E84-426E-40dd-AFC4-6F175D3DCCD1}">
-              <a14:hiddenFill xmlns:a14="http://schemas.microsoft.com/office/drawing/2010/main" xmlns="">
+              <a14:hiddenFill xmlns="" xmlns:a14="http://schemas.microsoft.com/office/drawing/2010/main">
                 <a:noFill/>
               </a14:hiddenFill>
             </a:ext>
             <a:ext uri="{91240B29-F687-4f45-9708-019B960494DF}">
-              <a14:hiddenLine xmlns:a14="http://schemas.microsoft.com/office/drawing/2010/main" xmlns="" w="9525">
+              <a14:hiddenLine xmlns="" xmlns:a14="http://schemas.microsoft.com/office/drawing/2010/main" w="9525">
                 <a:solidFill>
                   <a:srgbClr val="000000"/>
                 </a:solidFill>
@@ -2241,12 +2247,12 @@
           </a:ln>
           <a:extLst>
             <a:ext uri="{909E8E84-426E-40dd-AFC4-6F175D3DCCD1}">
-              <a14:hiddenFill xmlns:a14="http://schemas.microsoft.com/office/drawing/2010/main" xmlns="">
+              <a14:hiddenFill xmlns="" xmlns:a14="http://schemas.microsoft.com/office/drawing/2010/main">
                 <a:noFill/>
               </a14:hiddenFill>
             </a:ext>
             <a:ext uri="{91240B29-F687-4f45-9708-019B960494DF}">
-              <a14:hiddenLine xmlns:a14="http://schemas.microsoft.com/office/drawing/2010/main" xmlns="" w="9525">
+              <a14:hiddenLine xmlns="" xmlns:a14="http://schemas.microsoft.com/office/drawing/2010/main" w="9525">
                 <a:solidFill>
                   <a:srgbClr val="000000"/>
                 </a:solidFill>
@@ -2295,12 +2301,12 @@
           </a:ln>
           <a:extLst>
             <a:ext uri="{909E8E84-426E-40dd-AFC4-6F175D3DCCD1}">
-              <a14:hiddenFill xmlns:a14="http://schemas.microsoft.com/office/drawing/2010/main" xmlns="">
+              <a14:hiddenFill xmlns="" xmlns:a14="http://schemas.microsoft.com/office/drawing/2010/main">
                 <a:noFill/>
               </a14:hiddenFill>
             </a:ext>
             <a:ext uri="{91240B29-F687-4f45-9708-019B960494DF}">
-              <a14:hiddenLine xmlns:a14="http://schemas.microsoft.com/office/drawing/2010/main" xmlns="" w="9525">
+              <a14:hiddenLine xmlns="" xmlns:a14="http://schemas.microsoft.com/office/drawing/2010/main" w="9525">
                 <a:solidFill>
                   <a:srgbClr val="000000"/>
                 </a:solidFill>
@@ -2465,12 +2471,12 @@
           </a:ln>
           <a:extLst>
             <a:ext uri="{909E8E84-426E-40dd-AFC4-6F175D3DCCD1}">
-              <a14:hiddenFill xmlns:a14="http://schemas.microsoft.com/office/drawing/2010/main" xmlns="">
+              <a14:hiddenFill xmlns="" xmlns:a14="http://schemas.microsoft.com/office/drawing/2010/main">
                 <a:noFill/>
               </a14:hiddenFill>
             </a:ext>
             <a:ext uri="{91240B29-F687-4f45-9708-019B960494DF}">
-              <a14:hiddenLine xmlns:a14="http://schemas.microsoft.com/office/drawing/2010/main" xmlns="" w="9525">
+              <a14:hiddenLine xmlns="" xmlns:a14="http://schemas.microsoft.com/office/drawing/2010/main" w="9525">
                 <a:solidFill>
                   <a:srgbClr val="000000"/>
                 </a:solidFill>
@@ -2519,12 +2525,236 @@
           </a:ln>
           <a:extLst>
             <a:ext uri="{909E8E84-426E-40dd-AFC4-6F175D3DCCD1}">
-              <a14:hiddenFill xmlns:a14="http://schemas.microsoft.com/office/drawing/2010/main" xmlns="">
+              <a14:hiddenFill xmlns="" xmlns:a14="http://schemas.microsoft.com/office/drawing/2010/main">
                 <a:noFill/>
               </a14:hiddenFill>
             </a:ext>
             <a:ext uri="{91240B29-F687-4f45-9708-019B960494DF}">
-              <a14:hiddenLine xmlns:a14="http://schemas.microsoft.com/office/drawing/2010/main" xmlns="" w="9525">
+              <a14:hiddenLine xmlns="" xmlns:a14="http://schemas.microsoft.com/office/drawing/2010/main" w="9525">
+                <a:solidFill>
+                  <a:srgbClr val="000000"/>
+                </a:solidFill>
+                <a:round/>
+                <a:headEnd/>
+                <a:tailEnd/>
+              </a14:hiddenLine>
+            </a:ext>
+          </a:extLst>
+        </p:spPr>
+        <p:txBody>
+          <a:bodyPr vert="horz" wrap="square" lIns="243797" tIns="121899" rIns="243797" bIns="121899" numCol="1" anchor="t" anchorCtr="0" compatLnSpc="1">
+            <a:prstTxWarp prst="textNoShape">
+              <a:avLst/>
+            </a:prstTxWarp>
+          </a:bodyPr>
+          <a:lstStyle/>
+          <a:p>
+            <a:endParaRPr lang="en-US">
+              <a:solidFill>
+                <a:srgbClr val="4D4D4D"/>
+              </a:solidFill>
+            </a:endParaRPr>
+          </a:p>
+        </p:txBody>
+      </p:sp>
+      <p:sp>
+        <p:nvSpPr>
+          <p:cNvPr id="5" name="TextBox 4">
+            <a:extLst>
+              <a:ext uri="{FF2B5EF4-FFF2-40B4-BE49-F238E27FC236}">
+                <a16:creationId xmlns:a16="http://schemas.microsoft.com/office/drawing/2014/main" id="{6A66EF5C-C181-4F39-85B0-64A3AF06C2E3}"/>
+              </a:ext>
+            </a:extLst>
+          </p:cNvPr>
+          <p:cNvSpPr txBox="1"/>
+          <p:nvPr/>
+        </p:nvSpPr>
+        <p:spPr>
+          <a:xfrm>
+            <a:off x="10334563" y="741286"/>
+            <a:ext cx="3831497" cy="830997"/>
+          </a:xfrm>
+          <a:prstGeom prst="rect">
+            <a:avLst/>
+          </a:prstGeom>
+          <a:noFill/>
+        </p:spPr>
+        <p:txBody>
+          <a:bodyPr wrap="none" rtlCol="0">
+            <a:spAutoFit/>
+          </a:bodyPr>
+          <a:lstStyle/>
+          <a:p>
+            <a:pPr algn="ctr"/>
+            <a:r>
+              <a:rPr lang="en-US" sz="4800">
+                <a:solidFill>
+                  <a:srgbClr val="4D4D4D"/>
+                </a:solidFill>
+                <a:latin typeface="Lato Light"/>
+                <a:cs typeface="Lato Light"/>
+              </a:rPr>
+              <a:t>Job – Historic</a:t>
+            </a:r>
+          </a:p>
+        </p:txBody>
+      </p:sp>
+      <p:cxnSp>
+        <p:nvCxnSpPr>
+          <p:cNvPr id="7" name="Straight Connector 6">
+            <a:extLst>
+              <a:ext uri="{FF2B5EF4-FFF2-40B4-BE49-F238E27FC236}">
+                <a16:creationId xmlns:a16="http://schemas.microsoft.com/office/drawing/2014/main" id="{EE169823-7EE0-4E97-9F46-FCE273CAF355}"/>
+              </a:ext>
+            </a:extLst>
+          </p:cNvPr>
+          <p:cNvCxnSpPr/>
+          <p:nvPr/>
+        </p:nvCxnSpPr>
+        <p:spPr>
+          <a:xfrm rot="5400000">
+            <a:off x="12250307" y="1529002"/>
+            <a:ext cx="0" cy="1313401"/>
+          </a:xfrm>
+          <a:prstGeom prst="line">
+            <a:avLst/>
+          </a:prstGeom>
+          <a:ln w="38100" cmpd="sng">
+            <a:solidFill>
+              <a:srgbClr val="4D4D4D"/>
+            </a:solidFill>
+          </a:ln>
+        </p:spPr>
+        <p:style>
+          <a:lnRef idx="2">
+            <a:schemeClr val="accent1"/>
+          </a:lnRef>
+          <a:fillRef idx="0">
+            <a:schemeClr val="accent1"/>
+          </a:fillRef>
+          <a:effectRef idx="1">
+            <a:schemeClr val="accent1"/>
+          </a:effectRef>
+          <a:fontRef idx="minor">
+            <a:schemeClr val="tx1"/>
+          </a:fontRef>
+        </p:style>
+      </p:cxnSp>
+    </p:spTree>
+    <p:extLst>
+      <p:ext uri="{BB962C8B-B14F-4D97-AF65-F5344CB8AC3E}">
+        <p14:creationId xmlns:p14="http://schemas.microsoft.com/office/powerpoint/2010/main" val="921920859"/>
+      </p:ext>
+    </p:extLst>
+  </p:cSld>
+  <p:clrMapOvr>
+    <a:masterClrMapping/>
+  </p:clrMapOvr>
+  <p:transition spd="slow">
+    <p:push dir="u"/>
+  </p:transition>
+</p:sld>
+</file>
+
+<file path=ppt/slides/slide12.xml><?xml version="1.0" encoding="utf-8"?>
+<p:sld xmlns:a="http://schemas.openxmlformats.org/drawingml/2006/main" xmlns:r="http://schemas.openxmlformats.org/officeDocument/2006/relationships" xmlns:p="http://schemas.openxmlformats.org/presentationml/2006/main">
+  <p:cSld>
+    <p:spTree>
+      <p:nvGrpSpPr>
+        <p:cNvPr id="1" name=""/>
+        <p:cNvGrpSpPr/>
+        <p:nvPr/>
+      </p:nvGrpSpPr>
+      <p:grpSpPr>
+        <a:xfrm>
+          <a:off x="0" y="0"/>
+          <a:ext cx="0" cy="0"/>
+          <a:chOff x="0" y="0"/>
+          <a:chExt cx="0" cy="0"/>
+        </a:xfrm>
+      </p:grpSpPr>
+      <p:sp>
+        <p:nvSpPr>
+          <p:cNvPr id="44" name="Line 5"/>
+          <p:cNvSpPr>
+            <a:spLocks noChangeShapeType="1"/>
+          </p:cNvSpPr>
+          <p:nvPr/>
+        </p:nvSpPr>
+        <p:spPr bwMode="auto">
+          <a:xfrm>
+            <a:off x="1493979" y="-1748368"/>
+            <a:ext cx="0" cy="0"/>
+          </a:xfrm>
+          <a:prstGeom prst="line">
+            <a:avLst/>
+          </a:prstGeom>
+          <a:noFill/>
+          <a:ln>
+            <a:noFill/>
+          </a:ln>
+          <a:extLst>
+            <a:ext uri="{909E8E84-426E-40dd-AFC4-6F175D3DCCD1}">
+              <a14:hiddenFill xmlns="" xmlns:a14="http://schemas.microsoft.com/office/drawing/2010/main">
+                <a:noFill/>
+              </a14:hiddenFill>
+            </a:ext>
+            <a:ext uri="{91240B29-F687-4f45-9708-019B960494DF}">
+              <a14:hiddenLine xmlns="" xmlns:a14="http://schemas.microsoft.com/office/drawing/2010/main" w="9525">
+                <a:solidFill>
+                  <a:srgbClr val="000000"/>
+                </a:solidFill>
+                <a:round/>
+                <a:headEnd/>
+                <a:tailEnd/>
+              </a14:hiddenLine>
+            </a:ext>
+          </a:extLst>
+        </p:spPr>
+        <p:txBody>
+          <a:bodyPr vert="horz" wrap="square" lIns="243797" tIns="121899" rIns="243797" bIns="121899" numCol="1" anchor="t" anchorCtr="0" compatLnSpc="1">
+            <a:prstTxWarp prst="textNoShape">
+              <a:avLst/>
+            </a:prstTxWarp>
+          </a:bodyPr>
+          <a:lstStyle/>
+          <a:p>
+            <a:endParaRPr lang="en-US">
+              <a:solidFill>
+                <a:srgbClr val="4D4D4D"/>
+              </a:solidFill>
+            </a:endParaRPr>
+          </a:p>
+        </p:txBody>
+      </p:sp>
+      <p:sp>
+        <p:nvSpPr>
+          <p:cNvPr id="45" name="Line 6"/>
+          <p:cNvSpPr>
+            <a:spLocks noChangeShapeType="1"/>
+          </p:cNvSpPr>
+          <p:nvPr/>
+        </p:nvSpPr>
+        <p:spPr bwMode="auto">
+          <a:xfrm>
+            <a:off x="1493979" y="-1748368"/>
+            <a:ext cx="0" cy="0"/>
+          </a:xfrm>
+          <a:prstGeom prst="line">
+            <a:avLst/>
+          </a:prstGeom>
+          <a:noFill/>
+          <a:ln>
+            <a:noFill/>
+          </a:ln>
+          <a:extLst>
+            <a:ext uri="{909E8E84-426E-40dd-AFC4-6F175D3DCCD1}">
+              <a14:hiddenFill xmlns="" xmlns:a14="http://schemas.microsoft.com/office/drawing/2010/main">
+                <a:noFill/>
+              </a14:hiddenFill>
+            </a:ext>
+            <a:ext uri="{91240B29-F687-4f45-9708-019B960494DF}">
+              <a14:hiddenLine xmlns="" xmlns:a14="http://schemas.microsoft.com/office/drawing/2010/main" w="9525">
                 <a:solidFill>
                   <a:srgbClr val="000000"/>
                 </a:solidFill>
@@ -2693,7 +2923,7 @@
 </p:sld>
 </file>
 
-<file path=ppt/slides/slide12.xml><?xml version="1.0" encoding="utf-8"?>
+<file path=ppt/slides/slide13.xml><?xml version="1.0" encoding="utf-8"?>
 <p:sld xmlns:a="http://schemas.openxmlformats.org/drawingml/2006/main" xmlns:r="http://schemas.openxmlformats.org/officeDocument/2006/relationships" xmlns:p="http://schemas.openxmlformats.org/presentationml/2006/main">
   <p:cSld>
     <p:spTree>
@@ -4000,7 +4230,7 @@
 </p:sld>
 </file>
 
-<file path=ppt/slides/slide13.xml><?xml version="1.0" encoding="utf-8"?>
+<file path=ppt/slides/slide14.xml><?xml version="1.0" encoding="utf-8"?>
 <p:sld xmlns:a="http://schemas.openxmlformats.org/drawingml/2006/main" xmlns:r="http://schemas.openxmlformats.org/officeDocument/2006/relationships" xmlns:p="http://schemas.openxmlformats.org/presentationml/2006/main">
   <p:cSld>
     <p:spTree>
@@ -4039,12 +4269,12 @@
           </a:ln>
           <a:extLst>
             <a:ext uri="{909E8E84-426E-40dd-AFC4-6F175D3DCCD1}">
-              <a14:hiddenFill xmlns:a14="http://schemas.microsoft.com/office/drawing/2010/main" xmlns="">
+              <a14:hiddenFill xmlns="" xmlns:a14="http://schemas.microsoft.com/office/drawing/2010/main">
                 <a:noFill/>
               </a14:hiddenFill>
             </a:ext>
             <a:ext uri="{91240B29-F687-4f45-9708-019B960494DF}">
-              <a14:hiddenLine xmlns:a14="http://schemas.microsoft.com/office/drawing/2010/main" xmlns="" w="9525">
+              <a14:hiddenLine xmlns="" xmlns:a14="http://schemas.microsoft.com/office/drawing/2010/main" w="9525">
                 <a:solidFill>
                   <a:srgbClr val="000000"/>
                 </a:solidFill>
@@ -4093,12 +4323,12 @@
           </a:ln>
           <a:extLst>
             <a:ext uri="{909E8E84-426E-40dd-AFC4-6F175D3DCCD1}">
-              <a14:hiddenFill xmlns:a14="http://schemas.microsoft.com/office/drawing/2010/main" xmlns="">
+              <a14:hiddenFill xmlns="" xmlns:a14="http://schemas.microsoft.com/office/drawing/2010/main">
                 <a:noFill/>
               </a14:hiddenFill>
             </a:ext>
             <a:ext uri="{91240B29-F687-4f45-9708-019B960494DF}">
-              <a14:hiddenLine xmlns:a14="http://schemas.microsoft.com/office/drawing/2010/main" xmlns="" w="9525">
+              <a14:hiddenLine xmlns="" xmlns:a14="http://schemas.microsoft.com/office/drawing/2010/main" w="9525">
                 <a:solidFill>
                   <a:srgbClr val="000000"/>
                 </a:solidFill>
@@ -5698,12 +5928,12 @@
           </a:ln>
           <a:extLst>
             <a:ext uri="{909E8E84-426E-40dd-AFC4-6F175D3DCCD1}">
-              <a14:hiddenFill xmlns:a14="http://schemas.microsoft.com/office/drawing/2010/main" xmlns="">
+              <a14:hiddenFill xmlns="" xmlns:a14="http://schemas.microsoft.com/office/drawing/2010/main">
                 <a:noFill/>
               </a14:hiddenFill>
             </a:ext>
             <a:ext uri="{91240B29-F687-4f45-9708-019B960494DF}">
-              <a14:hiddenLine xmlns:a14="http://schemas.microsoft.com/office/drawing/2010/main" xmlns="" w="9525">
+              <a14:hiddenLine xmlns="" xmlns:a14="http://schemas.microsoft.com/office/drawing/2010/main" w="9525">
                 <a:solidFill>
                   <a:srgbClr val="000000"/>
                 </a:solidFill>
@@ -5748,12 +5978,12 @@
           </a:ln>
           <a:extLst>
             <a:ext uri="{909E8E84-426E-40dd-AFC4-6F175D3DCCD1}">
-              <a14:hiddenFill xmlns:a14="http://schemas.microsoft.com/office/drawing/2010/main" xmlns="">
+              <a14:hiddenFill xmlns="" xmlns:a14="http://schemas.microsoft.com/office/drawing/2010/main">
                 <a:noFill/>
               </a14:hiddenFill>
             </a:ext>
             <a:ext uri="{91240B29-F687-4f45-9708-019B960494DF}">
-              <a14:hiddenLine xmlns:a14="http://schemas.microsoft.com/office/drawing/2010/main" xmlns="" w="9525">
+              <a14:hiddenLine xmlns="" xmlns:a14="http://schemas.microsoft.com/office/drawing/2010/main" w="9525">
                 <a:solidFill>
                   <a:srgbClr val="000000"/>
                 </a:solidFill>
@@ -7296,12 +7526,12 @@
           </a:ln>
           <a:extLst>
             <a:ext uri="{909E8E84-426E-40dd-AFC4-6F175D3DCCD1}">
-              <a14:hiddenFill xmlns:a14="http://schemas.microsoft.com/office/drawing/2010/main" xmlns="">
+              <a14:hiddenFill xmlns="" xmlns:a14="http://schemas.microsoft.com/office/drawing/2010/main">
                 <a:noFill/>
               </a14:hiddenFill>
             </a:ext>
             <a:ext uri="{91240B29-F687-4f45-9708-019B960494DF}">
-              <a14:hiddenLine xmlns:a14="http://schemas.microsoft.com/office/drawing/2010/main" xmlns="" w="9525">
+              <a14:hiddenLine xmlns="" xmlns:a14="http://schemas.microsoft.com/office/drawing/2010/main" w="9525">
                 <a:solidFill>
                   <a:srgbClr val="000000"/>
                 </a:solidFill>
@@ -7350,12 +7580,12 @@
           </a:ln>
           <a:extLst>
             <a:ext uri="{909E8E84-426E-40dd-AFC4-6F175D3DCCD1}">
-              <a14:hiddenFill xmlns:a14="http://schemas.microsoft.com/office/drawing/2010/main" xmlns="">
+              <a14:hiddenFill xmlns="" xmlns:a14="http://schemas.microsoft.com/office/drawing/2010/main">
                 <a:noFill/>
               </a14:hiddenFill>
             </a:ext>
             <a:ext uri="{91240B29-F687-4f45-9708-019B960494DF}">
-              <a14:hiddenLine xmlns:a14="http://schemas.microsoft.com/office/drawing/2010/main" xmlns="" w="9525">
+              <a14:hiddenLine xmlns="" xmlns:a14="http://schemas.microsoft.com/office/drawing/2010/main" w="9525">
                 <a:solidFill>
                   <a:srgbClr val="000000"/>
                 </a:solidFill>
@@ -8560,12 +8790,12 @@
           </a:ln>
           <a:extLst>
             <a:ext uri="{909E8E84-426E-40dd-AFC4-6F175D3DCCD1}">
-              <a14:hiddenFill xmlns:a14="http://schemas.microsoft.com/office/drawing/2010/main" xmlns="">
+              <a14:hiddenFill xmlns="" xmlns:a14="http://schemas.microsoft.com/office/drawing/2010/main">
                 <a:noFill/>
               </a14:hiddenFill>
             </a:ext>
             <a:ext uri="{91240B29-F687-4f45-9708-019B960494DF}">
-              <a14:hiddenLine xmlns:a14="http://schemas.microsoft.com/office/drawing/2010/main" xmlns="" w="9525">
+              <a14:hiddenLine xmlns="" xmlns:a14="http://schemas.microsoft.com/office/drawing/2010/main" w="9525">
                 <a:solidFill>
                   <a:srgbClr val="000000"/>
                 </a:solidFill>
@@ -8614,12 +8844,12 @@
           </a:ln>
           <a:extLst>
             <a:ext uri="{909E8E84-426E-40dd-AFC4-6F175D3DCCD1}">
-              <a14:hiddenFill xmlns:a14="http://schemas.microsoft.com/office/drawing/2010/main" xmlns="">
+              <a14:hiddenFill xmlns="" xmlns:a14="http://schemas.microsoft.com/office/drawing/2010/main">
                 <a:noFill/>
               </a14:hiddenFill>
             </a:ext>
             <a:ext uri="{91240B29-F687-4f45-9708-019B960494DF}">
-              <a14:hiddenLine xmlns:a14="http://schemas.microsoft.com/office/drawing/2010/main" xmlns="" w="9525">
+              <a14:hiddenLine xmlns="" xmlns:a14="http://schemas.microsoft.com/office/drawing/2010/main" w="9525">
                 <a:solidFill>
                   <a:srgbClr val="000000"/>
                 </a:solidFill>
@@ -9338,12 +9568,12 @@
           </a:ln>
           <a:extLst>
             <a:ext uri="{909E8E84-426E-40dd-AFC4-6F175D3DCCD1}">
-              <a14:hiddenFill xmlns:a14="http://schemas.microsoft.com/office/drawing/2010/main" xmlns="">
+              <a14:hiddenFill xmlns="" xmlns:a14="http://schemas.microsoft.com/office/drawing/2010/main">
                 <a:noFill/>
               </a14:hiddenFill>
             </a:ext>
             <a:ext uri="{91240B29-F687-4f45-9708-019B960494DF}">
-              <a14:hiddenLine xmlns:a14="http://schemas.microsoft.com/office/drawing/2010/main" xmlns="" w="9525">
+              <a14:hiddenLine xmlns="" xmlns:a14="http://schemas.microsoft.com/office/drawing/2010/main" w="9525">
                 <a:solidFill>
                   <a:srgbClr val="000000"/>
                 </a:solidFill>
@@ -9392,12 +9622,12 @@
           </a:ln>
           <a:extLst>
             <a:ext uri="{909E8E84-426E-40dd-AFC4-6F175D3DCCD1}">
-              <a14:hiddenFill xmlns:a14="http://schemas.microsoft.com/office/drawing/2010/main" xmlns="">
+              <a14:hiddenFill xmlns="" xmlns:a14="http://schemas.microsoft.com/office/drawing/2010/main">
                 <a:noFill/>
               </a14:hiddenFill>
             </a:ext>
             <a:ext uri="{91240B29-F687-4f45-9708-019B960494DF}">
-              <a14:hiddenLine xmlns:a14="http://schemas.microsoft.com/office/drawing/2010/main" xmlns="" w="9525">
+              <a14:hiddenLine xmlns="" xmlns:a14="http://schemas.microsoft.com/office/drawing/2010/main" w="9525">
                 <a:solidFill>
                   <a:srgbClr val="000000"/>
                 </a:solidFill>
@@ -11416,12 +11646,12 @@
           </a:ln>
           <a:extLst>
             <a:ext uri="{909E8E84-426E-40dd-AFC4-6F175D3DCCD1}">
-              <a14:hiddenFill xmlns:a14="http://schemas.microsoft.com/office/drawing/2010/main" xmlns="">
+              <a14:hiddenFill xmlns="" xmlns:a14="http://schemas.microsoft.com/office/drawing/2010/main">
                 <a:noFill/>
               </a14:hiddenFill>
             </a:ext>
             <a:ext uri="{91240B29-F687-4f45-9708-019B960494DF}">
-              <a14:hiddenLine xmlns:a14="http://schemas.microsoft.com/office/drawing/2010/main" xmlns="" w="9525">
+              <a14:hiddenLine xmlns="" xmlns:a14="http://schemas.microsoft.com/office/drawing/2010/main" w="9525">
                 <a:solidFill>
                   <a:srgbClr val="000000"/>
                 </a:solidFill>
@@ -11470,12 +11700,12 @@
           </a:ln>
           <a:extLst>
             <a:ext uri="{909E8E84-426E-40dd-AFC4-6F175D3DCCD1}">
-              <a14:hiddenFill xmlns:a14="http://schemas.microsoft.com/office/drawing/2010/main" xmlns="">
+              <a14:hiddenFill xmlns="" xmlns:a14="http://schemas.microsoft.com/office/drawing/2010/main">
                 <a:noFill/>
               </a14:hiddenFill>
             </a:ext>
             <a:ext uri="{91240B29-F687-4f45-9708-019B960494DF}">
-              <a14:hiddenLine xmlns:a14="http://schemas.microsoft.com/office/drawing/2010/main" xmlns="" w="9525">
+              <a14:hiddenLine xmlns="" xmlns:a14="http://schemas.microsoft.com/office/drawing/2010/main" w="9525">
                 <a:solidFill>
                   <a:srgbClr val="000000"/>
                 </a:solidFill>
@@ -12719,12 +12949,12 @@
           </a:ln>
           <a:extLst>
             <a:ext uri="{909E8E84-426E-40dd-AFC4-6F175D3DCCD1}">
-              <a14:hiddenFill xmlns:a14="http://schemas.microsoft.com/office/drawing/2010/main" xmlns="">
+              <a14:hiddenFill xmlns="" xmlns:a14="http://schemas.microsoft.com/office/drawing/2010/main">
                 <a:noFill/>
               </a14:hiddenFill>
             </a:ext>
             <a:ext uri="{91240B29-F687-4f45-9708-019B960494DF}">
-              <a14:hiddenLine xmlns:a14="http://schemas.microsoft.com/office/drawing/2010/main" xmlns="" w="9525">
+              <a14:hiddenLine xmlns="" xmlns:a14="http://schemas.microsoft.com/office/drawing/2010/main" w="9525">
                 <a:solidFill>
                   <a:srgbClr val="000000"/>
                 </a:solidFill>
@@ -12773,12 +13003,12 @@
           </a:ln>
           <a:extLst>
             <a:ext uri="{909E8E84-426E-40dd-AFC4-6F175D3DCCD1}">
-              <a14:hiddenFill xmlns:a14="http://schemas.microsoft.com/office/drawing/2010/main" xmlns="">
+              <a14:hiddenFill xmlns="" xmlns:a14="http://schemas.microsoft.com/office/drawing/2010/main">
                 <a:noFill/>
               </a14:hiddenFill>
             </a:ext>
             <a:ext uri="{91240B29-F687-4f45-9708-019B960494DF}">
-              <a14:hiddenLine xmlns:a14="http://schemas.microsoft.com/office/drawing/2010/main" xmlns="" w="9525">
+              <a14:hiddenLine xmlns="" xmlns:a14="http://schemas.microsoft.com/office/drawing/2010/main" w="9525">
                 <a:solidFill>
                   <a:srgbClr val="000000"/>
                 </a:solidFill>

</xml_diff>

<commit_message>
Added report for Azure SQL source
</commit_message>
<xml_diff>
--- a/PowerPoint/PrintixPowerBIDesign.pptx
+++ b/PowerPoint/PrintixPowerBIDesign.pptx
@@ -16,7 +16,7 @@
     <p:sldId id="279" r:id="rId7"/>
     <p:sldId id="290" r:id="rId8"/>
     <p:sldId id="283" r:id="rId9"/>
-    <p:sldId id="280" r:id="rId10"/>
+    <p:sldId id="292" r:id="rId10"/>
     <p:sldId id="284" r:id="rId11"/>
     <p:sldId id="291" r:id="rId12"/>
     <p:sldId id="287" r:id="rId13"/>
@@ -161,7 +161,7 @@
         </p14:section>
         <p14:section name="User - Historic" id="{97B42A93-C3C4-40EF-98E0-7E6405DCEC92}">
           <p14:sldIdLst>
-            <p14:sldId id="280"/>
+            <p14:sldId id="292"/>
           </p14:sldIdLst>
         </p14:section>
         <p14:section name="Queues - Overview" id="{59A2BF2B-B53B-41E1-AA1F-7DD9E46C4E64}">
@@ -314,7 +314,7 @@
             <a:fld id="{EFC10EE1-B198-C942-8235-326C972CBB30}" type="datetimeFigureOut">
               <a:rPr lang="en-US" smtClean="0"/>
               <a:pPr/>
-              <a:t>5/22/2018</a:t>
+              <a:t>12/27/2018</a:t>
             </a:fld>
             <a:endParaRPr lang="en-US" dirty="0"/>
           </a:p>
@@ -2049,12 +2049,12 @@
           </a:ln>
           <a:extLst>
             <a:ext uri="{909E8E84-426E-40dd-AFC4-6F175D3DCCD1}">
-              <a14:hiddenFill xmlns="" xmlns:a14="http://schemas.microsoft.com/office/drawing/2010/main">
+              <a14:hiddenFill xmlns:a14="http://schemas.microsoft.com/office/drawing/2010/main" xmlns="">
                 <a:noFill/>
               </a14:hiddenFill>
             </a:ext>
             <a:ext uri="{91240B29-F687-4f45-9708-019B960494DF}">
-              <a14:hiddenLine xmlns="" xmlns:a14="http://schemas.microsoft.com/office/drawing/2010/main" w="9525">
+              <a14:hiddenLine xmlns:a14="http://schemas.microsoft.com/office/drawing/2010/main" xmlns="" w="9525">
                 <a:solidFill>
                   <a:srgbClr val="000000"/>
                 </a:solidFill>
@@ -2099,12 +2099,12 @@
           </a:ln>
           <a:extLst>
             <a:ext uri="{909E8E84-426E-40dd-AFC4-6F175D3DCCD1}">
-              <a14:hiddenFill xmlns="" xmlns:a14="http://schemas.microsoft.com/office/drawing/2010/main">
+              <a14:hiddenFill xmlns:a14="http://schemas.microsoft.com/office/drawing/2010/main" xmlns="">
                 <a:noFill/>
               </a14:hiddenFill>
             </a:ext>
             <a:ext uri="{91240B29-F687-4f45-9708-019B960494DF}">
-              <a14:hiddenLine xmlns="" xmlns:a14="http://schemas.microsoft.com/office/drawing/2010/main" w="9525">
+              <a14:hiddenLine xmlns:a14="http://schemas.microsoft.com/office/drawing/2010/main" xmlns="" w="9525">
                 <a:solidFill>
                   <a:srgbClr val="000000"/>
                 </a:solidFill>
@@ -2247,12 +2247,12 @@
           </a:ln>
           <a:extLst>
             <a:ext uri="{909E8E84-426E-40dd-AFC4-6F175D3DCCD1}">
-              <a14:hiddenFill xmlns="" xmlns:a14="http://schemas.microsoft.com/office/drawing/2010/main">
+              <a14:hiddenFill xmlns:a14="http://schemas.microsoft.com/office/drawing/2010/main" xmlns="">
                 <a:noFill/>
               </a14:hiddenFill>
             </a:ext>
             <a:ext uri="{91240B29-F687-4f45-9708-019B960494DF}">
-              <a14:hiddenLine xmlns="" xmlns:a14="http://schemas.microsoft.com/office/drawing/2010/main" w="9525">
+              <a14:hiddenLine xmlns:a14="http://schemas.microsoft.com/office/drawing/2010/main" xmlns="" w="9525">
                 <a:solidFill>
                   <a:srgbClr val="000000"/>
                 </a:solidFill>
@@ -2301,12 +2301,12 @@
           </a:ln>
           <a:extLst>
             <a:ext uri="{909E8E84-426E-40dd-AFC4-6F175D3DCCD1}">
-              <a14:hiddenFill xmlns="" xmlns:a14="http://schemas.microsoft.com/office/drawing/2010/main">
+              <a14:hiddenFill xmlns:a14="http://schemas.microsoft.com/office/drawing/2010/main" xmlns="">
                 <a:noFill/>
               </a14:hiddenFill>
             </a:ext>
             <a:ext uri="{91240B29-F687-4f45-9708-019B960494DF}">
-              <a14:hiddenLine xmlns="" xmlns:a14="http://schemas.microsoft.com/office/drawing/2010/main" w="9525">
+              <a14:hiddenLine xmlns:a14="http://schemas.microsoft.com/office/drawing/2010/main" xmlns="" w="9525">
                 <a:solidFill>
                   <a:srgbClr val="000000"/>
                 </a:solidFill>
@@ -2471,12 +2471,12 @@
           </a:ln>
           <a:extLst>
             <a:ext uri="{909E8E84-426E-40dd-AFC4-6F175D3DCCD1}">
-              <a14:hiddenFill xmlns="" xmlns:a14="http://schemas.microsoft.com/office/drawing/2010/main">
+              <a14:hiddenFill xmlns:a14="http://schemas.microsoft.com/office/drawing/2010/main" xmlns="">
                 <a:noFill/>
               </a14:hiddenFill>
             </a:ext>
             <a:ext uri="{91240B29-F687-4f45-9708-019B960494DF}">
-              <a14:hiddenLine xmlns="" xmlns:a14="http://schemas.microsoft.com/office/drawing/2010/main" w="9525">
+              <a14:hiddenLine xmlns:a14="http://schemas.microsoft.com/office/drawing/2010/main" xmlns="" w="9525">
                 <a:solidFill>
                   <a:srgbClr val="000000"/>
                 </a:solidFill>
@@ -2525,12 +2525,12 @@
           </a:ln>
           <a:extLst>
             <a:ext uri="{909E8E84-426E-40dd-AFC4-6F175D3DCCD1}">
-              <a14:hiddenFill xmlns="" xmlns:a14="http://schemas.microsoft.com/office/drawing/2010/main">
+              <a14:hiddenFill xmlns:a14="http://schemas.microsoft.com/office/drawing/2010/main" xmlns="">
                 <a:noFill/>
               </a14:hiddenFill>
             </a:ext>
             <a:ext uri="{91240B29-F687-4f45-9708-019B960494DF}">
-              <a14:hiddenLine xmlns="" xmlns:a14="http://schemas.microsoft.com/office/drawing/2010/main" w="9525">
+              <a14:hiddenLine xmlns:a14="http://schemas.microsoft.com/office/drawing/2010/main" xmlns="" w="9525">
                 <a:solidFill>
                   <a:srgbClr val="000000"/>
                 </a:solidFill>
@@ -2695,12 +2695,12 @@
           </a:ln>
           <a:extLst>
             <a:ext uri="{909E8E84-426E-40dd-AFC4-6F175D3DCCD1}">
-              <a14:hiddenFill xmlns="" xmlns:a14="http://schemas.microsoft.com/office/drawing/2010/main">
+              <a14:hiddenFill xmlns:a14="http://schemas.microsoft.com/office/drawing/2010/main" xmlns="">
                 <a:noFill/>
               </a14:hiddenFill>
             </a:ext>
             <a:ext uri="{91240B29-F687-4f45-9708-019B960494DF}">
-              <a14:hiddenLine xmlns="" xmlns:a14="http://schemas.microsoft.com/office/drawing/2010/main" w="9525">
+              <a14:hiddenLine xmlns:a14="http://schemas.microsoft.com/office/drawing/2010/main" xmlns="" w="9525">
                 <a:solidFill>
                   <a:srgbClr val="000000"/>
                 </a:solidFill>
@@ -2749,12 +2749,12 @@
           </a:ln>
           <a:extLst>
             <a:ext uri="{909E8E84-426E-40dd-AFC4-6F175D3DCCD1}">
-              <a14:hiddenFill xmlns="" xmlns:a14="http://schemas.microsoft.com/office/drawing/2010/main">
+              <a14:hiddenFill xmlns:a14="http://schemas.microsoft.com/office/drawing/2010/main" xmlns="">
                 <a:noFill/>
               </a14:hiddenFill>
             </a:ext>
             <a:ext uri="{91240B29-F687-4f45-9708-019B960494DF}">
-              <a14:hiddenLine xmlns="" xmlns:a14="http://schemas.microsoft.com/office/drawing/2010/main" w="9525">
+              <a14:hiddenLine xmlns:a14="http://schemas.microsoft.com/office/drawing/2010/main" xmlns="" w="9525">
                 <a:solidFill>
                   <a:srgbClr val="000000"/>
                 </a:solidFill>
@@ -4269,12 +4269,12 @@
           </a:ln>
           <a:extLst>
             <a:ext uri="{909E8E84-426E-40dd-AFC4-6F175D3DCCD1}">
-              <a14:hiddenFill xmlns="" xmlns:a14="http://schemas.microsoft.com/office/drawing/2010/main">
+              <a14:hiddenFill xmlns:a14="http://schemas.microsoft.com/office/drawing/2010/main" xmlns="">
                 <a:noFill/>
               </a14:hiddenFill>
             </a:ext>
             <a:ext uri="{91240B29-F687-4f45-9708-019B960494DF}">
-              <a14:hiddenLine xmlns="" xmlns:a14="http://schemas.microsoft.com/office/drawing/2010/main" w="9525">
+              <a14:hiddenLine xmlns:a14="http://schemas.microsoft.com/office/drawing/2010/main" xmlns="" w="9525">
                 <a:solidFill>
                   <a:srgbClr val="000000"/>
                 </a:solidFill>
@@ -4323,12 +4323,12 @@
           </a:ln>
           <a:extLst>
             <a:ext uri="{909E8E84-426E-40dd-AFC4-6F175D3DCCD1}">
-              <a14:hiddenFill xmlns="" xmlns:a14="http://schemas.microsoft.com/office/drawing/2010/main">
+              <a14:hiddenFill xmlns:a14="http://schemas.microsoft.com/office/drawing/2010/main" xmlns="">
                 <a:noFill/>
               </a14:hiddenFill>
             </a:ext>
             <a:ext uri="{91240B29-F687-4f45-9708-019B960494DF}">
-              <a14:hiddenLine xmlns="" xmlns:a14="http://schemas.microsoft.com/office/drawing/2010/main" w="9525">
+              <a14:hiddenLine xmlns:a14="http://schemas.microsoft.com/office/drawing/2010/main" xmlns="" w="9525">
                 <a:solidFill>
                   <a:srgbClr val="000000"/>
                 </a:solidFill>
@@ -4661,55 +4661,6 @@
                 <a:cs typeface="Lato Light"/>
               </a:rPr>
               <a:t>Network information</a:t>
-            </a:r>
-          </a:p>
-        </p:txBody>
-      </p:sp>
-      <p:sp>
-        <p:nvSpPr>
-          <p:cNvPr id="33" name="TextBox 32">
-            <a:extLst>
-              <a:ext uri="{FF2B5EF4-FFF2-40B4-BE49-F238E27FC236}">
-                <a16:creationId xmlns:a16="http://schemas.microsoft.com/office/drawing/2014/main" id="{A0041372-36AA-4AEF-9BA7-E875F6A00173}"/>
-              </a:ext>
-            </a:extLst>
-          </p:cNvPr>
-          <p:cNvSpPr txBox="1"/>
-          <p:nvPr/>
-        </p:nvSpPr>
-        <p:spPr>
-          <a:xfrm>
-            <a:off x="5314950" y="1418422"/>
-            <a:ext cx="2355119" cy="517028"/>
-          </a:xfrm>
-          <a:prstGeom prst="rect">
-            <a:avLst/>
-          </a:prstGeom>
-          <a:noFill/>
-        </p:spPr>
-        <p:txBody>
-          <a:bodyPr wrap="square" lIns="243791" tIns="91422" rIns="243791" bIns="91422" rtlCol="0">
-            <a:spAutoFit/>
-          </a:bodyPr>
-          <a:lstStyle/>
-          <a:p>
-            <a:pPr algn="r">
-              <a:lnSpc>
-                <a:spcPct val="90000"/>
-              </a:lnSpc>
-              <a:spcBef>
-                <a:spcPts val="2134"/>
-              </a:spcBef>
-            </a:pPr>
-            <a:r>
-              <a:rPr lang="en-US" sz="2400" b="1" dirty="0">
-                <a:solidFill>
-                  <a:srgbClr val="4D4D4D"/>
-                </a:solidFill>
-                <a:latin typeface="Lato Light"/>
-                <a:cs typeface="Lato Light"/>
-              </a:rPr>
-              <a:t>Workstation</a:t>
             </a:r>
           </a:p>
         </p:txBody>
@@ -5928,12 +5879,12 @@
           </a:ln>
           <a:extLst>
             <a:ext uri="{909E8E84-426E-40dd-AFC4-6F175D3DCCD1}">
-              <a14:hiddenFill xmlns="" xmlns:a14="http://schemas.microsoft.com/office/drawing/2010/main">
+              <a14:hiddenFill xmlns:a14="http://schemas.microsoft.com/office/drawing/2010/main" xmlns="">
                 <a:noFill/>
               </a14:hiddenFill>
             </a:ext>
             <a:ext uri="{91240B29-F687-4f45-9708-019B960494DF}">
-              <a14:hiddenLine xmlns="" xmlns:a14="http://schemas.microsoft.com/office/drawing/2010/main" w="9525">
+              <a14:hiddenLine xmlns:a14="http://schemas.microsoft.com/office/drawing/2010/main" xmlns="" w="9525">
                 <a:solidFill>
                   <a:srgbClr val="000000"/>
                 </a:solidFill>
@@ -5978,12 +5929,12 @@
           </a:ln>
           <a:extLst>
             <a:ext uri="{909E8E84-426E-40dd-AFC4-6F175D3DCCD1}">
-              <a14:hiddenFill xmlns="" xmlns:a14="http://schemas.microsoft.com/office/drawing/2010/main">
+              <a14:hiddenFill xmlns:a14="http://schemas.microsoft.com/office/drawing/2010/main" xmlns="">
                 <a:noFill/>
               </a14:hiddenFill>
             </a:ext>
             <a:ext uri="{91240B29-F687-4f45-9708-019B960494DF}">
-              <a14:hiddenLine xmlns="" xmlns:a14="http://schemas.microsoft.com/office/drawing/2010/main" w="9525">
+              <a14:hiddenLine xmlns:a14="http://schemas.microsoft.com/office/drawing/2010/main" xmlns="" w="9525">
                 <a:solidFill>
                   <a:srgbClr val="000000"/>
                 </a:solidFill>
@@ -7526,12 +7477,12 @@
           </a:ln>
           <a:extLst>
             <a:ext uri="{909E8E84-426E-40dd-AFC4-6F175D3DCCD1}">
-              <a14:hiddenFill xmlns="" xmlns:a14="http://schemas.microsoft.com/office/drawing/2010/main">
+              <a14:hiddenFill xmlns:a14="http://schemas.microsoft.com/office/drawing/2010/main" xmlns="">
                 <a:noFill/>
               </a14:hiddenFill>
             </a:ext>
             <a:ext uri="{91240B29-F687-4f45-9708-019B960494DF}">
-              <a14:hiddenLine xmlns="" xmlns:a14="http://schemas.microsoft.com/office/drawing/2010/main" w="9525">
+              <a14:hiddenLine xmlns:a14="http://schemas.microsoft.com/office/drawing/2010/main" xmlns="" w="9525">
                 <a:solidFill>
                   <a:srgbClr val="000000"/>
                 </a:solidFill>
@@ -7580,12 +7531,12 @@
           </a:ln>
           <a:extLst>
             <a:ext uri="{909E8E84-426E-40dd-AFC4-6F175D3DCCD1}">
-              <a14:hiddenFill xmlns="" xmlns:a14="http://schemas.microsoft.com/office/drawing/2010/main">
+              <a14:hiddenFill xmlns:a14="http://schemas.microsoft.com/office/drawing/2010/main" xmlns="">
                 <a:noFill/>
               </a14:hiddenFill>
             </a:ext>
             <a:ext uri="{91240B29-F687-4f45-9708-019B960494DF}">
-              <a14:hiddenLine xmlns="" xmlns:a14="http://schemas.microsoft.com/office/drawing/2010/main" w="9525">
+              <a14:hiddenLine xmlns:a14="http://schemas.microsoft.com/office/drawing/2010/main" xmlns="" w="9525">
                 <a:solidFill>
                   <a:srgbClr val="000000"/>
                 </a:solidFill>
@@ -8790,12 +8741,12 @@
           </a:ln>
           <a:extLst>
             <a:ext uri="{909E8E84-426E-40dd-AFC4-6F175D3DCCD1}">
-              <a14:hiddenFill xmlns="" xmlns:a14="http://schemas.microsoft.com/office/drawing/2010/main">
+              <a14:hiddenFill xmlns:a14="http://schemas.microsoft.com/office/drawing/2010/main" xmlns="">
                 <a:noFill/>
               </a14:hiddenFill>
             </a:ext>
             <a:ext uri="{91240B29-F687-4f45-9708-019B960494DF}">
-              <a14:hiddenLine xmlns="" xmlns:a14="http://schemas.microsoft.com/office/drawing/2010/main" w="9525">
+              <a14:hiddenLine xmlns:a14="http://schemas.microsoft.com/office/drawing/2010/main" xmlns="" w="9525">
                 <a:solidFill>
                   <a:srgbClr val="000000"/>
                 </a:solidFill>
@@ -8844,12 +8795,12 @@
           </a:ln>
           <a:extLst>
             <a:ext uri="{909E8E84-426E-40dd-AFC4-6F175D3DCCD1}">
-              <a14:hiddenFill xmlns="" xmlns:a14="http://schemas.microsoft.com/office/drawing/2010/main">
+              <a14:hiddenFill xmlns:a14="http://schemas.microsoft.com/office/drawing/2010/main" xmlns="">
                 <a:noFill/>
               </a14:hiddenFill>
             </a:ext>
             <a:ext uri="{91240B29-F687-4f45-9708-019B960494DF}">
-              <a14:hiddenLine xmlns="" xmlns:a14="http://schemas.microsoft.com/office/drawing/2010/main" w="9525">
+              <a14:hiddenLine xmlns:a14="http://schemas.microsoft.com/office/drawing/2010/main" xmlns="" w="9525">
                 <a:solidFill>
                   <a:srgbClr val="000000"/>
                 </a:solidFill>
@@ -9158,55 +9109,6 @@
                 <a:cs typeface="Lato Light"/>
               </a:rPr>
               <a:t>Per day</a:t>
-            </a:r>
-          </a:p>
-        </p:txBody>
-      </p:sp>
-      <p:sp>
-        <p:nvSpPr>
-          <p:cNvPr id="33" name="TextBox 32">
-            <a:extLst>
-              <a:ext uri="{FF2B5EF4-FFF2-40B4-BE49-F238E27FC236}">
-                <a16:creationId xmlns:a16="http://schemas.microsoft.com/office/drawing/2014/main" id="{A0041372-36AA-4AEF-9BA7-E875F6A00173}"/>
-              </a:ext>
-            </a:extLst>
-          </p:cNvPr>
-          <p:cNvSpPr txBox="1"/>
-          <p:nvPr/>
-        </p:nvSpPr>
-        <p:spPr>
-          <a:xfrm>
-            <a:off x="6140186" y="1418422"/>
-            <a:ext cx="1529883" cy="517028"/>
-          </a:xfrm>
-          <a:prstGeom prst="rect">
-            <a:avLst/>
-          </a:prstGeom>
-          <a:noFill/>
-        </p:spPr>
-        <p:txBody>
-          <a:bodyPr wrap="square" lIns="243791" tIns="91422" rIns="243791" bIns="91422" rtlCol="0">
-            <a:spAutoFit/>
-          </a:bodyPr>
-          <a:lstStyle/>
-          <a:p>
-            <a:pPr algn="r">
-              <a:lnSpc>
-                <a:spcPct val="90000"/>
-              </a:lnSpc>
-              <a:spcBef>
-                <a:spcPts val="2134"/>
-              </a:spcBef>
-            </a:pPr>
-            <a:r>
-              <a:rPr lang="en-US" sz="2400" b="1" dirty="0">
-                <a:solidFill>
-                  <a:srgbClr val="4D4D4D"/>
-                </a:solidFill>
-                <a:latin typeface="Lato Light"/>
-                <a:cs typeface="Lato Light"/>
-              </a:rPr>
-              <a:t>Printer</a:t>
             </a:r>
           </a:p>
         </p:txBody>
@@ -9464,55 +9366,6 @@
           </a:fontRef>
         </p:style>
       </p:cxnSp>
-      <p:sp>
-        <p:nvSpPr>
-          <p:cNvPr id="21" name="TextBox 20">
-            <a:extLst>
-              <a:ext uri="{FF2B5EF4-FFF2-40B4-BE49-F238E27FC236}">
-                <a16:creationId xmlns:a16="http://schemas.microsoft.com/office/drawing/2014/main" id="{7110FB15-A4AE-4CDE-A904-8907DD4063B1}"/>
-              </a:ext>
-            </a:extLst>
-          </p:cNvPr>
-          <p:cNvSpPr txBox="1"/>
-          <p:nvPr/>
-        </p:nvSpPr>
-        <p:spPr>
-          <a:xfrm>
-            <a:off x="18364201" y="1418422"/>
-            <a:ext cx="2310316" cy="517028"/>
-          </a:xfrm>
-          <a:prstGeom prst="rect">
-            <a:avLst/>
-          </a:prstGeom>
-          <a:noFill/>
-        </p:spPr>
-        <p:txBody>
-          <a:bodyPr wrap="square" lIns="243791" tIns="91422" rIns="243791" bIns="91422" rtlCol="0">
-            <a:spAutoFit/>
-          </a:bodyPr>
-          <a:lstStyle/>
-          <a:p>
-            <a:pPr algn="r">
-              <a:lnSpc>
-                <a:spcPct val="90000"/>
-              </a:lnSpc>
-              <a:spcBef>
-                <a:spcPts val="2134"/>
-              </a:spcBef>
-            </a:pPr>
-            <a:r>
-              <a:rPr lang="en-US" sz="2400" b="1" dirty="0">
-                <a:solidFill>
-                  <a:srgbClr val="4D4D4D"/>
-                </a:solidFill>
-                <a:latin typeface="Lato Light"/>
-                <a:cs typeface="Lato Light"/>
-              </a:rPr>
-              <a:t>Time range</a:t>
-            </a:r>
-          </a:p>
-        </p:txBody>
-      </p:sp>
     </p:spTree>
     <p:extLst>
       <p:ext uri="{BB962C8B-B14F-4D97-AF65-F5344CB8AC3E}">
@@ -9568,12 +9421,12 @@
           </a:ln>
           <a:extLst>
             <a:ext uri="{909E8E84-426E-40dd-AFC4-6F175D3DCCD1}">
-              <a14:hiddenFill xmlns="" xmlns:a14="http://schemas.microsoft.com/office/drawing/2010/main">
+              <a14:hiddenFill xmlns:a14="http://schemas.microsoft.com/office/drawing/2010/main" xmlns="">
                 <a:noFill/>
               </a14:hiddenFill>
             </a:ext>
             <a:ext uri="{91240B29-F687-4f45-9708-019B960494DF}">
-              <a14:hiddenLine xmlns="" xmlns:a14="http://schemas.microsoft.com/office/drawing/2010/main" w="9525">
+              <a14:hiddenLine xmlns:a14="http://schemas.microsoft.com/office/drawing/2010/main" xmlns="" w="9525">
                 <a:solidFill>
                   <a:srgbClr val="000000"/>
                 </a:solidFill>
@@ -9622,12 +9475,12 @@
           </a:ln>
           <a:extLst>
             <a:ext uri="{909E8E84-426E-40dd-AFC4-6F175D3DCCD1}">
-              <a14:hiddenFill xmlns="" xmlns:a14="http://schemas.microsoft.com/office/drawing/2010/main">
+              <a14:hiddenFill xmlns:a14="http://schemas.microsoft.com/office/drawing/2010/main" xmlns="">
                 <a:noFill/>
               </a14:hiddenFill>
             </a:ext>
             <a:ext uri="{91240B29-F687-4f45-9708-019B960494DF}">
-              <a14:hiddenLine xmlns="" xmlns:a14="http://schemas.microsoft.com/office/drawing/2010/main" w="9525">
+              <a14:hiddenLine xmlns:a14="http://schemas.microsoft.com/office/drawing/2010/main" xmlns="" w="9525">
                 <a:solidFill>
                   <a:srgbClr val="000000"/>
                 </a:solidFill>
@@ -9892,104 +9745,6 @@
                 <a:cs typeface="Lato Light"/>
               </a:rPr>
               <a:t>Per day</a:t>
-            </a:r>
-          </a:p>
-        </p:txBody>
-      </p:sp>
-      <p:sp>
-        <p:nvSpPr>
-          <p:cNvPr id="33" name="TextBox 32">
-            <a:extLst>
-              <a:ext uri="{FF2B5EF4-FFF2-40B4-BE49-F238E27FC236}">
-                <a16:creationId xmlns:a16="http://schemas.microsoft.com/office/drawing/2014/main" id="{A0041372-36AA-4AEF-9BA7-E875F6A00173}"/>
-              </a:ext>
-            </a:extLst>
-          </p:cNvPr>
-          <p:cNvSpPr txBox="1"/>
-          <p:nvPr/>
-        </p:nvSpPr>
-        <p:spPr>
-          <a:xfrm>
-            <a:off x="6140186" y="1418422"/>
-            <a:ext cx="1529883" cy="517028"/>
-          </a:xfrm>
-          <a:prstGeom prst="rect">
-            <a:avLst/>
-          </a:prstGeom>
-          <a:noFill/>
-        </p:spPr>
-        <p:txBody>
-          <a:bodyPr wrap="square" lIns="243791" tIns="91422" rIns="243791" bIns="91422" rtlCol="0">
-            <a:spAutoFit/>
-          </a:bodyPr>
-          <a:lstStyle/>
-          <a:p>
-            <a:pPr algn="r">
-              <a:lnSpc>
-                <a:spcPct val="90000"/>
-              </a:lnSpc>
-              <a:spcBef>
-                <a:spcPts val="2134"/>
-              </a:spcBef>
-            </a:pPr>
-            <a:r>
-              <a:rPr lang="en-US" sz="2400" b="1" dirty="0">
-                <a:solidFill>
-                  <a:srgbClr val="4D4D4D"/>
-                </a:solidFill>
-                <a:latin typeface="Lato Light"/>
-                <a:cs typeface="Lato Light"/>
-              </a:rPr>
-              <a:t>Printer</a:t>
-            </a:r>
-          </a:p>
-        </p:txBody>
-      </p:sp>
-      <p:sp>
-        <p:nvSpPr>
-          <p:cNvPr id="34" name="TextBox 33">
-            <a:extLst>
-              <a:ext uri="{FF2B5EF4-FFF2-40B4-BE49-F238E27FC236}">
-                <a16:creationId xmlns:a16="http://schemas.microsoft.com/office/drawing/2014/main" id="{BF1C49D7-13B8-4ECC-A63F-9318FFE42EAC}"/>
-              </a:ext>
-            </a:extLst>
-          </p:cNvPr>
-          <p:cNvSpPr txBox="1"/>
-          <p:nvPr/>
-        </p:nvSpPr>
-        <p:spPr>
-          <a:xfrm>
-            <a:off x="18364201" y="1418422"/>
-            <a:ext cx="2310316" cy="517028"/>
-          </a:xfrm>
-          <a:prstGeom prst="rect">
-            <a:avLst/>
-          </a:prstGeom>
-          <a:noFill/>
-        </p:spPr>
-        <p:txBody>
-          <a:bodyPr wrap="square" lIns="243791" tIns="91422" rIns="243791" bIns="91422" rtlCol="0">
-            <a:spAutoFit/>
-          </a:bodyPr>
-          <a:lstStyle/>
-          <a:p>
-            <a:pPr algn="r">
-              <a:lnSpc>
-                <a:spcPct val="90000"/>
-              </a:lnSpc>
-              <a:spcBef>
-                <a:spcPts val="2134"/>
-              </a:spcBef>
-            </a:pPr>
-            <a:r>
-              <a:rPr lang="en-US" sz="2400" b="1" dirty="0">
-                <a:solidFill>
-                  <a:srgbClr val="4D4D4D"/>
-                </a:solidFill>
-                <a:latin typeface="Lato Light"/>
-                <a:cs typeface="Lato Light"/>
-              </a:rPr>
-              <a:t>Time range</a:t>
             </a:r>
           </a:p>
         </p:txBody>
@@ -10437,7 +10192,7 @@
                 </a:solidFill>
                 <a:cs typeface="Lato Light"/>
               </a:rPr>
-              <a:t>Pull Print</a:t>
+              <a:t>Secure Print</a:t>
             </a:r>
             <a:endParaRPr lang="en-US" sz="2400" dirty="0">
               <a:solidFill>
@@ -11201,55 +10956,6 @@
       </p:sp>
       <p:sp>
         <p:nvSpPr>
-          <p:cNvPr id="42" name="TextBox 41">
-            <a:extLst>
-              <a:ext uri="{FF2B5EF4-FFF2-40B4-BE49-F238E27FC236}">
-                <a16:creationId xmlns:a16="http://schemas.microsoft.com/office/drawing/2014/main" id="{E27A7165-0137-4384-A778-010DABDB3A8D}"/>
-              </a:ext>
-            </a:extLst>
-          </p:cNvPr>
-          <p:cNvSpPr txBox="1"/>
-          <p:nvPr/>
-        </p:nvSpPr>
-        <p:spPr>
-          <a:xfrm>
-            <a:off x="5772150" y="1418422"/>
-            <a:ext cx="1897919" cy="517028"/>
-          </a:xfrm>
-          <a:prstGeom prst="rect">
-            <a:avLst/>
-          </a:prstGeom>
-          <a:noFill/>
-        </p:spPr>
-        <p:txBody>
-          <a:bodyPr wrap="square" lIns="243791" tIns="91422" rIns="243791" bIns="91422" rtlCol="0">
-            <a:spAutoFit/>
-          </a:bodyPr>
-          <a:lstStyle/>
-          <a:p>
-            <a:pPr algn="ctr">
-              <a:lnSpc>
-                <a:spcPct val="90000"/>
-              </a:lnSpc>
-              <a:spcBef>
-                <a:spcPts val="2134"/>
-              </a:spcBef>
-            </a:pPr>
-            <a:r>
-              <a:rPr lang="en-US" sz="2400" b="1" dirty="0">
-                <a:solidFill>
-                  <a:srgbClr val="4D4D4D"/>
-                </a:solidFill>
-                <a:latin typeface="Lato Light"/>
-                <a:cs typeface="Lato Light"/>
-              </a:rPr>
-              <a:t>Location</a:t>
-            </a:r>
-          </a:p>
-        </p:txBody>
-      </p:sp>
-      <p:sp>
-        <p:nvSpPr>
           <p:cNvPr id="45" name="TextBox 44">
             <a:extLst>
               <a:ext uri="{FF2B5EF4-FFF2-40B4-BE49-F238E27FC236}">
@@ -11292,7 +10998,7 @@
                 <a:latin typeface="Lato Light"/>
                 <a:cs typeface="Lato Light"/>
               </a:rPr>
-              <a:t>Pull Print</a:t>
+              <a:t>Secure Print</a:t>
             </a:r>
           </a:p>
         </p:txBody>
@@ -11489,55 +11195,6 @@
                 <a:cs typeface="Lato Light"/>
               </a:rPr>
               <a:t>Printers</a:t>
-            </a:r>
-          </a:p>
-        </p:txBody>
-      </p:sp>
-      <p:sp>
-        <p:nvSpPr>
-          <p:cNvPr id="53" name="TextBox 52">
-            <a:extLst>
-              <a:ext uri="{FF2B5EF4-FFF2-40B4-BE49-F238E27FC236}">
-                <a16:creationId xmlns:a16="http://schemas.microsoft.com/office/drawing/2014/main" id="{E834C2AE-CC74-47B1-A9CA-F0D9F581DE4F}"/>
-              </a:ext>
-            </a:extLst>
-          </p:cNvPr>
-          <p:cNvSpPr txBox="1"/>
-          <p:nvPr/>
-        </p:nvSpPr>
-        <p:spPr>
-          <a:xfrm>
-            <a:off x="18364201" y="1418422"/>
-            <a:ext cx="2310316" cy="517028"/>
-          </a:xfrm>
-          <a:prstGeom prst="rect">
-            <a:avLst/>
-          </a:prstGeom>
-          <a:noFill/>
-        </p:spPr>
-        <p:txBody>
-          <a:bodyPr wrap="square" lIns="243791" tIns="91422" rIns="243791" bIns="91422" rtlCol="0">
-            <a:spAutoFit/>
-          </a:bodyPr>
-          <a:lstStyle/>
-          <a:p>
-            <a:pPr algn="r">
-              <a:lnSpc>
-                <a:spcPct val="90000"/>
-              </a:lnSpc>
-              <a:spcBef>
-                <a:spcPts val="2134"/>
-              </a:spcBef>
-            </a:pPr>
-            <a:r>
-              <a:rPr lang="en-US" sz="2400" b="1" dirty="0">
-                <a:solidFill>
-                  <a:srgbClr val="4D4D4D"/>
-                </a:solidFill>
-                <a:latin typeface="Lato Light"/>
-                <a:cs typeface="Lato Light"/>
-              </a:rPr>
-              <a:t>Time range</a:t>
             </a:r>
           </a:p>
         </p:txBody>
@@ -11646,12 +11303,12 @@
           </a:ln>
           <a:extLst>
             <a:ext uri="{909E8E84-426E-40dd-AFC4-6F175D3DCCD1}">
-              <a14:hiddenFill xmlns="" xmlns:a14="http://schemas.microsoft.com/office/drawing/2010/main">
+              <a14:hiddenFill xmlns:a14="http://schemas.microsoft.com/office/drawing/2010/main" xmlns="">
                 <a:noFill/>
               </a14:hiddenFill>
             </a:ext>
             <a:ext uri="{91240B29-F687-4f45-9708-019B960494DF}">
-              <a14:hiddenLine xmlns="" xmlns:a14="http://schemas.microsoft.com/office/drawing/2010/main" w="9525">
+              <a14:hiddenLine xmlns:a14="http://schemas.microsoft.com/office/drawing/2010/main" xmlns="" w="9525">
                 <a:solidFill>
                   <a:srgbClr val="000000"/>
                 </a:solidFill>
@@ -11700,12 +11357,12 @@
           </a:ln>
           <a:extLst>
             <a:ext uri="{909E8E84-426E-40dd-AFC4-6F175D3DCCD1}">
-              <a14:hiddenFill xmlns="" xmlns:a14="http://schemas.microsoft.com/office/drawing/2010/main">
+              <a14:hiddenFill xmlns:a14="http://schemas.microsoft.com/office/drawing/2010/main" xmlns="">
                 <a:noFill/>
               </a14:hiddenFill>
             </a:ext>
             <a:ext uri="{91240B29-F687-4f45-9708-019B960494DF}">
-              <a14:hiddenLine xmlns="" xmlns:a14="http://schemas.microsoft.com/office/drawing/2010/main" w="9525">
+              <a14:hiddenLine xmlns:a14="http://schemas.microsoft.com/office/drawing/2010/main" xmlns="" w="9525">
                 <a:solidFill>
                   <a:srgbClr val="000000"/>
                 </a:solidFill>
@@ -12949,12 +12606,12 @@
           </a:ln>
           <a:extLst>
             <a:ext uri="{909E8E84-426E-40dd-AFC4-6F175D3DCCD1}">
-              <a14:hiddenFill xmlns="" xmlns:a14="http://schemas.microsoft.com/office/drawing/2010/main">
+              <a14:hiddenFill xmlns:a14="http://schemas.microsoft.com/office/drawing/2010/main" xmlns="">
                 <a:noFill/>
               </a14:hiddenFill>
             </a:ext>
             <a:ext uri="{91240B29-F687-4f45-9708-019B960494DF}">
-              <a14:hiddenLine xmlns="" xmlns:a14="http://schemas.microsoft.com/office/drawing/2010/main" w="9525">
+              <a14:hiddenLine xmlns:a14="http://schemas.microsoft.com/office/drawing/2010/main" xmlns="" w="9525">
                 <a:solidFill>
                   <a:srgbClr val="000000"/>
                 </a:solidFill>
@@ -13003,12 +12660,12 @@
           </a:ln>
           <a:extLst>
             <a:ext uri="{909E8E84-426E-40dd-AFC4-6F175D3DCCD1}">
-              <a14:hiddenFill xmlns="" xmlns:a14="http://schemas.microsoft.com/office/drawing/2010/main">
+              <a14:hiddenFill xmlns:a14="http://schemas.microsoft.com/office/drawing/2010/main" xmlns="">
                 <a:noFill/>
               </a14:hiddenFill>
             </a:ext>
             <a:ext uri="{91240B29-F687-4f45-9708-019B960494DF}">
-              <a14:hiddenLine xmlns="" xmlns:a14="http://schemas.microsoft.com/office/drawing/2010/main" w="9525">
+              <a14:hiddenLine xmlns:a14="http://schemas.microsoft.com/office/drawing/2010/main" xmlns="" w="9525">
                 <a:solidFill>
                   <a:srgbClr val="000000"/>
                 </a:solidFill>
@@ -13049,8 +12706,8 @@
         </p:nvSpPr>
         <p:spPr>
           <a:xfrm>
-            <a:off x="10225557" y="738196"/>
-            <a:ext cx="4049507" cy="830997"/>
+            <a:off x="9591571" y="738196"/>
+            <a:ext cx="5317481" cy="830997"/>
           </a:xfrm>
           <a:prstGeom prst="rect">
             <a:avLst/>
@@ -13069,10 +12726,9 @@
                 <a:solidFill>
                   <a:srgbClr val="4D4D4D"/>
                 </a:solidFill>
-                <a:latin typeface="Lato Light"/>
                 <a:cs typeface="Lato Light"/>
               </a:rPr>
-              <a:t>User - Historic</a:t>
+              <a:t>User – Print Details</a:t>
             </a:r>
           </a:p>
         </p:txBody>
@@ -13091,8 +12747,8 @@
         </p:nvSpPr>
         <p:spPr>
           <a:xfrm>
-            <a:off x="548047" y="2659043"/>
-            <a:ext cx="1494582" cy="517028"/>
+            <a:off x="347988" y="2326644"/>
+            <a:ext cx="2989165" cy="517028"/>
           </a:xfrm>
           <a:prstGeom prst="rect">
             <a:avLst/>
@@ -13105,7 +12761,7 @@
           </a:bodyPr>
           <a:lstStyle/>
           <a:p>
-            <a:pPr>
+            <a:pPr algn="ctr">
               <a:lnSpc>
                 <a:spcPct val="90000"/>
               </a:lnSpc>
@@ -13118,20 +12774,25 @@
                 <a:solidFill>
                   <a:srgbClr val="4D4D4D"/>
                 </a:solidFill>
-                <a:latin typeface="Lato Light"/>
                 <a:cs typeface="Lato Light"/>
               </a:rPr>
-              <a:t>Pages</a:t>
+              <a:t>Printed 2-sided</a:t>
             </a:r>
-          </a:p>
-        </p:txBody>
-      </p:sp>
-      <p:sp>
-        <p:nvSpPr>
-          <p:cNvPr id="109" name="TextBox 108">
+            <a:endParaRPr lang="en-US" sz="2400" dirty="0">
+              <a:solidFill>
+                <a:srgbClr val="4D4D4D"/>
+              </a:solidFill>
+              <a:latin typeface="Lato Light"/>
+            </a:endParaRPr>
+          </a:p>
+        </p:txBody>
+      </p:sp>
+      <p:sp>
+        <p:nvSpPr>
+          <p:cNvPr id="114" name="TextBox 113">
             <a:extLst>
               <a:ext uri="{FF2B5EF4-FFF2-40B4-BE49-F238E27FC236}">
-                <a16:creationId xmlns:a16="http://schemas.microsoft.com/office/drawing/2014/main" id="{0F384D0D-6BEE-4001-8046-BA4DDD7F9CE3}"/>
+                <a16:creationId xmlns:a16="http://schemas.microsoft.com/office/drawing/2014/main" id="{2A327888-FDAE-4BFF-9470-5E94C5B0315E}"/>
               </a:ext>
             </a:extLst>
           </p:cNvPr>
@@ -13140,7 +12801,7 @@
         </p:nvSpPr>
         <p:spPr>
           <a:xfrm>
-            <a:off x="548048" y="8386024"/>
+            <a:off x="14292795" y="8394066"/>
             <a:ext cx="2989165" cy="517028"/>
           </a:xfrm>
           <a:prstGeom prst="rect">
@@ -13154,7 +12815,7 @@
           </a:bodyPr>
           <a:lstStyle/>
           <a:p>
-            <a:pPr>
+            <a:pPr algn="r">
               <a:lnSpc>
                 <a:spcPct val="90000"/>
               </a:lnSpc>
@@ -13163,24 +12824,29 @@
               </a:spcBef>
             </a:pPr>
             <a:r>
-              <a:rPr lang="en-US" sz="2400" dirty="0">
+              <a:rPr lang="en-US" sz="2400">
                 <a:solidFill>
                   <a:srgbClr val="4D4D4D"/>
                 </a:solidFill>
-                <a:latin typeface="Lato Light"/>
                 <a:cs typeface="Lato Light"/>
               </a:rPr>
-              <a:t>Jobs</a:t>
+              <a:t>Workstations</a:t>
             </a:r>
-          </a:p>
-        </p:txBody>
-      </p:sp>
-      <p:sp>
-        <p:nvSpPr>
-          <p:cNvPr id="112" name="TextBox 111">
+            <a:endParaRPr lang="en-US" sz="2400" dirty="0">
+              <a:solidFill>
+                <a:srgbClr val="4D4D4D"/>
+              </a:solidFill>
+              <a:cs typeface="Lato Light"/>
+            </a:endParaRPr>
+          </a:p>
+        </p:txBody>
+      </p:sp>
+      <p:sp>
+        <p:nvSpPr>
+          <p:cNvPr id="24" name="TextBox 23">
             <a:extLst>
               <a:ext uri="{FF2B5EF4-FFF2-40B4-BE49-F238E27FC236}">
-                <a16:creationId xmlns:a16="http://schemas.microsoft.com/office/drawing/2014/main" id="{66DFBA01-4548-4B60-A04D-ABD7A6EDCE01}"/>
+                <a16:creationId xmlns:a16="http://schemas.microsoft.com/office/drawing/2014/main" id="{8A36327E-1820-43E3-9996-1C119EB929D2}"/>
               </a:ext>
             </a:extLst>
           </p:cNvPr>
@@ -13189,8 +12855,8 @@
         </p:nvSpPr>
         <p:spPr>
           <a:xfrm>
-            <a:off x="20851001" y="2659043"/>
-            <a:ext cx="2989165" cy="517028"/>
+            <a:off x="11423883" y="1553507"/>
+            <a:ext cx="1529883" cy="517028"/>
           </a:xfrm>
           <a:prstGeom prst="rect">
             <a:avLst/>
@@ -13219,17 +12885,17 @@
                 <a:latin typeface="Lato Light"/>
                 <a:cs typeface="Lato Light"/>
               </a:rPr>
-              <a:t>Toners</a:t>
+              <a:t>Per day</a:t>
             </a:r>
           </a:p>
         </p:txBody>
       </p:sp>
       <p:sp>
         <p:nvSpPr>
-          <p:cNvPr id="114" name="TextBox 113">
+          <p:cNvPr id="20" name="TextBox 19">
             <a:extLst>
               <a:ext uri="{FF2B5EF4-FFF2-40B4-BE49-F238E27FC236}">
-                <a16:creationId xmlns:a16="http://schemas.microsoft.com/office/drawing/2014/main" id="{2A327888-FDAE-4BFF-9470-5E94C5B0315E}"/>
+                <a16:creationId xmlns:a16="http://schemas.microsoft.com/office/drawing/2014/main" id="{AE403E1A-98EF-4F68-9851-97F19A0770E3}"/>
               </a:ext>
             </a:extLst>
           </p:cNvPr>
@@ -13238,7 +12904,56 @@
         </p:nvSpPr>
         <p:spPr>
           <a:xfrm>
-            <a:off x="20840438" y="8386024"/>
+            <a:off x="8079318" y="2326644"/>
+            <a:ext cx="2016013" cy="517028"/>
+          </a:xfrm>
+          <a:prstGeom prst="rect">
+            <a:avLst/>
+          </a:prstGeom>
+          <a:noFill/>
+        </p:spPr>
+        <p:txBody>
+          <a:bodyPr wrap="square" lIns="243791" tIns="91422" rIns="243791" bIns="91422" rtlCol="0">
+            <a:spAutoFit/>
+          </a:bodyPr>
+          <a:lstStyle/>
+          <a:p>
+            <a:pPr algn="ctr">
+              <a:lnSpc>
+                <a:spcPct val="90000"/>
+              </a:lnSpc>
+              <a:spcBef>
+                <a:spcPts val="2134"/>
+              </a:spcBef>
+            </a:pPr>
+            <a:r>
+              <a:rPr lang="en-US" sz="2400" dirty="0">
+                <a:solidFill>
+                  <a:srgbClr val="4D4D4D"/>
+                </a:solidFill>
+                <a:latin typeface="Lato Light"/>
+                <a:cs typeface="Lato Light"/>
+              </a:rPr>
+              <a:t>Paper Size</a:t>
+            </a:r>
+          </a:p>
+        </p:txBody>
+      </p:sp>
+      <p:sp>
+        <p:nvSpPr>
+          <p:cNvPr id="25" name="TextBox 24">
+            <a:extLst>
+              <a:ext uri="{FF2B5EF4-FFF2-40B4-BE49-F238E27FC236}">
+                <a16:creationId xmlns:a16="http://schemas.microsoft.com/office/drawing/2014/main" id="{B2A3DF0A-4D35-4B9A-8618-665328380448}"/>
+              </a:ext>
+            </a:extLst>
+          </p:cNvPr>
+          <p:cNvSpPr txBox="1"/>
+          <p:nvPr/>
+        </p:nvSpPr>
+        <p:spPr>
+          <a:xfrm>
+            <a:off x="-488624" y="8394066"/>
             <a:ext cx="2989165" cy="517028"/>
           </a:xfrm>
           <a:prstGeom prst="rect">
@@ -13265,19 +12980,273 @@
                 <a:solidFill>
                   <a:srgbClr val="4D4D4D"/>
                 </a:solidFill>
+                <a:latin typeface="Lato Light"/>
                 <a:cs typeface="Lato Light"/>
               </a:rPr>
-              <a:t>Active Users</a:t>
+              <a:t>Total Sheets</a:t>
             </a:r>
           </a:p>
         </p:txBody>
       </p:sp>
       <p:sp>
         <p:nvSpPr>
-          <p:cNvPr id="24" name="TextBox 23">
+          <p:cNvPr id="23" name="Text Placeholder 2">
             <a:extLst>
               <a:ext uri="{FF2B5EF4-FFF2-40B4-BE49-F238E27FC236}">
-                <a16:creationId xmlns:a16="http://schemas.microsoft.com/office/drawing/2014/main" id="{8A36327E-1820-43E3-9996-1C119EB929D2}"/>
+                <a16:creationId xmlns:a16="http://schemas.microsoft.com/office/drawing/2014/main" id="{99ABAAAA-8C7C-4A1A-9C77-7FF06C773C7E}"/>
+              </a:ext>
+            </a:extLst>
+          </p:cNvPr>
+          <p:cNvSpPr txBox="1">
+            <a:spLocks/>
+          </p:cNvSpPr>
+          <p:nvPr/>
+        </p:nvSpPr>
+        <p:spPr>
+          <a:xfrm>
+            <a:off x="10133545" y="5115180"/>
+            <a:ext cx="4159250" cy="4159250"/>
+          </a:xfrm>
+          <a:prstGeom prst="rect">
+            <a:avLst/>
+          </a:prstGeom>
+        </p:spPr>
+        <p:txBody>
+          <a:bodyPr anchor="ctr" anchorCtr="1"/>
+          <a:lstStyle>
+            <a:lvl1pPr marL="0" indent="0" algn="l" defTabSz="1828434" rtl="0" eaLnBrk="1" latinLnBrk="0" hangingPunct="1">
+              <a:lnSpc>
+                <a:spcPct val="90000"/>
+              </a:lnSpc>
+              <a:spcBef>
+                <a:spcPts val="2000"/>
+              </a:spcBef>
+              <a:buFont typeface="Arial" panose="020B0604020202020204" pitchFamily="34" charset="0"/>
+              <a:buNone/>
+              <a:defRPr lang="en-US" sz="4800" kern="1200" dirty="0" smtClean="0">
+                <a:solidFill>
+                  <a:schemeClr val="tx1"/>
+                </a:solidFill>
+                <a:effectLst/>
+                <a:latin typeface="Lato Light"/>
+                <a:ea typeface="+mn-ea"/>
+                <a:cs typeface="Lato Light"/>
+              </a:defRPr>
+            </a:lvl1pPr>
+            <a:lvl2pPr marL="914217" indent="0" algn="l" defTabSz="1828434" rtl="0" eaLnBrk="1" latinLnBrk="0" hangingPunct="1">
+              <a:lnSpc>
+                <a:spcPct val="90000"/>
+              </a:lnSpc>
+              <a:spcBef>
+                <a:spcPts val="1000"/>
+              </a:spcBef>
+              <a:buFont typeface="Arial" panose="020B0604020202020204" pitchFamily="34" charset="0"/>
+              <a:buNone/>
+              <a:defRPr lang="en-US" sz="4000" kern="1200" dirty="0" smtClean="0">
+                <a:solidFill>
+                  <a:schemeClr val="tx1"/>
+                </a:solidFill>
+                <a:effectLst/>
+                <a:latin typeface="Lato Light"/>
+                <a:ea typeface="+mn-ea"/>
+                <a:cs typeface="Lato Light"/>
+              </a:defRPr>
+            </a:lvl2pPr>
+            <a:lvl3pPr marL="1828434" indent="0" algn="l" defTabSz="1828434" rtl="0" eaLnBrk="1" latinLnBrk="0" hangingPunct="1">
+              <a:lnSpc>
+                <a:spcPct val="90000"/>
+              </a:lnSpc>
+              <a:spcBef>
+                <a:spcPts val="1000"/>
+              </a:spcBef>
+              <a:buFont typeface="Arial" panose="020B0604020202020204" pitchFamily="34" charset="0"/>
+              <a:buNone/>
+              <a:defRPr lang="en-US" sz="3600" kern="1200" dirty="0" smtClean="0">
+                <a:solidFill>
+                  <a:schemeClr val="tx1"/>
+                </a:solidFill>
+                <a:effectLst/>
+                <a:latin typeface="Lato Light"/>
+                <a:ea typeface="+mn-ea"/>
+                <a:cs typeface="Lato Light"/>
+              </a:defRPr>
+            </a:lvl3pPr>
+            <a:lvl4pPr marL="2742651" indent="0" algn="l" defTabSz="1828434" rtl="0" eaLnBrk="1" latinLnBrk="0" hangingPunct="1">
+              <a:lnSpc>
+                <a:spcPct val="90000"/>
+              </a:lnSpc>
+              <a:spcBef>
+                <a:spcPts val="1000"/>
+              </a:spcBef>
+              <a:buFont typeface="Arial" panose="020B0604020202020204" pitchFamily="34" charset="0"/>
+              <a:buNone/>
+              <a:defRPr lang="en-US" sz="3200" kern="1200" dirty="0" smtClean="0">
+                <a:solidFill>
+                  <a:schemeClr val="tx1"/>
+                </a:solidFill>
+                <a:effectLst/>
+                <a:latin typeface="Lato Light"/>
+                <a:ea typeface="+mn-ea"/>
+                <a:cs typeface="Lato Light"/>
+              </a:defRPr>
+            </a:lvl4pPr>
+            <a:lvl5pPr marL="3656868" indent="0" algn="l" defTabSz="1828434" rtl="0" eaLnBrk="1" latinLnBrk="0" hangingPunct="1">
+              <a:lnSpc>
+                <a:spcPct val="90000"/>
+              </a:lnSpc>
+              <a:spcBef>
+                <a:spcPts val="1000"/>
+              </a:spcBef>
+              <a:buFont typeface="Arial" panose="020B0604020202020204" pitchFamily="34" charset="0"/>
+              <a:buNone/>
+              <a:defRPr lang="en-US" sz="3200" kern="1200" dirty="0">
+                <a:solidFill>
+                  <a:schemeClr val="tx1"/>
+                </a:solidFill>
+                <a:effectLst/>
+                <a:latin typeface="Lato Light"/>
+                <a:ea typeface="+mn-ea"/>
+                <a:cs typeface="Lato Light"/>
+              </a:defRPr>
+            </a:lvl5pPr>
+            <a:lvl6pPr marL="5028194" indent="-457109" algn="l" defTabSz="1828434" rtl="0" eaLnBrk="1" latinLnBrk="0" hangingPunct="1">
+              <a:lnSpc>
+                <a:spcPct val="90000"/>
+              </a:lnSpc>
+              <a:spcBef>
+                <a:spcPts val="1000"/>
+              </a:spcBef>
+              <a:buFont typeface="Arial" panose="020B0604020202020204" pitchFamily="34" charset="0"/>
+              <a:buChar char="•"/>
+              <a:defRPr sz="3600" kern="1200">
+                <a:solidFill>
+                  <a:schemeClr val="tx1"/>
+                </a:solidFill>
+                <a:latin typeface="+mn-lt"/>
+                <a:ea typeface="+mn-ea"/>
+                <a:cs typeface="+mn-cs"/>
+              </a:defRPr>
+            </a:lvl6pPr>
+            <a:lvl7pPr marL="5942411" indent="-457109" algn="l" defTabSz="1828434" rtl="0" eaLnBrk="1" latinLnBrk="0" hangingPunct="1">
+              <a:lnSpc>
+                <a:spcPct val="90000"/>
+              </a:lnSpc>
+              <a:spcBef>
+                <a:spcPts val="1000"/>
+              </a:spcBef>
+              <a:buFont typeface="Arial" panose="020B0604020202020204" pitchFamily="34" charset="0"/>
+              <a:buChar char="•"/>
+              <a:defRPr sz="3600" kern="1200">
+                <a:solidFill>
+                  <a:schemeClr val="tx1"/>
+                </a:solidFill>
+                <a:latin typeface="+mn-lt"/>
+                <a:ea typeface="+mn-ea"/>
+                <a:cs typeface="+mn-cs"/>
+              </a:defRPr>
+            </a:lvl7pPr>
+            <a:lvl8pPr marL="6856628" indent="-457109" algn="l" defTabSz="1828434" rtl="0" eaLnBrk="1" latinLnBrk="0" hangingPunct="1">
+              <a:lnSpc>
+                <a:spcPct val="90000"/>
+              </a:lnSpc>
+              <a:spcBef>
+                <a:spcPts val="1000"/>
+              </a:spcBef>
+              <a:buFont typeface="Arial" panose="020B0604020202020204" pitchFamily="34" charset="0"/>
+              <a:buChar char="•"/>
+              <a:defRPr sz="3600" kern="1200">
+                <a:solidFill>
+                  <a:schemeClr val="tx1"/>
+                </a:solidFill>
+                <a:latin typeface="+mn-lt"/>
+                <a:ea typeface="+mn-ea"/>
+                <a:cs typeface="+mn-cs"/>
+              </a:defRPr>
+            </a:lvl8pPr>
+            <a:lvl9pPr marL="7770846" indent="-457109" algn="l" defTabSz="1828434" rtl="0" eaLnBrk="1" latinLnBrk="0" hangingPunct="1">
+              <a:lnSpc>
+                <a:spcPct val="90000"/>
+              </a:lnSpc>
+              <a:spcBef>
+                <a:spcPts val="1000"/>
+              </a:spcBef>
+              <a:buFont typeface="Arial" panose="020B0604020202020204" pitchFamily="34" charset="0"/>
+              <a:buChar char="•"/>
+              <a:defRPr sz="3600" kern="1200">
+                <a:solidFill>
+                  <a:schemeClr val="tx1"/>
+                </a:solidFill>
+                <a:latin typeface="+mn-lt"/>
+                <a:ea typeface="+mn-ea"/>
+                <a:cs typeface="+mn-cs"/>
+              </a:defRPr>
+            </a:lvl9pPr>
+          </a:lstStyle>
+          <a:p>
+            <a:r>
+              <a:rPr lang="nb-NO" sz="19900" dirty="0">
+                <a:solidFill>
+                  <a:srgbClr val="4D4D4D"/>
+                </a:solidFill>
+                <a:latin typeface="icons" panose="02000509000000000000" pitchFamily="49" charset="0"/>
+              </a:rPr>
+              <a:t>6</a:t>
+            </a:r>
+            <a:endParaRPr lang="nb-NO" sz="71400" dirty="0">
+              <a:solidFill>
+                <a:srgbClr val="4D4D4D"/>
+              </a:solidFill>
+            </a:endParaRPr>
+          </a:p>
+        </p:txBody>
+      </p:sp>
+      <p:cxnSp>
+        <p:nvCxnSpPr>
+          <p:cNvPr id="26" name="Straight Connector 25">
+            <a:extLst>
+              <a:ext uri="{FF2B5EF4-FFF2-40B4-BE49-F238E27FC236}">
+                <a16:creationId xmlns:a16="http://schemas.microsoft.com/office/drawing/2014/main" id="{7BFEC2E0-0EB6-4BF0-A7AC-89811187E19A}"/>
+              </a:ext>
+            </a:extLst>
+          </p:cNvPr>
+          <p:cNvCxnSpPr/>
+          <p:nvPr/>
+        </p:nvCxnSpPr>
+        <p:spPr>
+          <a:xfrm rot="5400000">
+            <a:off x="12250307" y="1529002"/>
+            <a:ext cx="0" cy="1313401"/>
+          </a:xfrm>
+          <a:prstGeom prst="line">
+            <a:avLst/>
+          </a:prstGeom>
+          <a:ln w="38100" cmpd="sng">
+            <a:solidFill>
+              <a:srgbClr val="4D4D4D"/>
+            </a:solidFill>
+          </a:ln>
+        </p:spPr>
+        <p:style>
+          <a:lnRef idx="2">
+            <a:schemeClr val="accent1"/>
+          </a:lnRef>
+          <a:fillRef idx="0">
+            <a:schemeClr val="accent1"/>
+          </a:fillRef>
+          <a:effectRef idx="1">
+            <a:schemeClr val="accent1"/>
+          </a:effectRef>
+          <a:fontRef idx="minor">
+            <a:schemeClr val="tx1"/>
+          </a:fontRef>
+        </p:style>
+      </p:cxnSp>
+      <p:sp>
+        <p:nvSpPr>
+          <p:cNvPr id="28" name="TextBox 27">
+            <a:extLst>
+              <a:ext uri="{FF2B5EF4-FFF2-40B4-BE49-F238E27FC236}">
+                <a16:creationId xmlns:a16="http://schemas.microsoft.com/office/drawing/2014/main" id="{B0ACC797-27DB-4524-8768-4343688BAFE6}"/>
               </a:ext>
             </a:extLst>
           </p:cNvPr>
@@ -13286,8 +13255,8 @@
         </p:nvSpPr>
         <p:spPr>
           <a:xfrm>
-            <a:off x="11423883" y="1553507"/>
-            <a:ext cx="1529883" cy="517028"/>
+            <a:off x="4283814" y="2326644"/>
+            <a:ext cx="2949497" cy="517028"/>
           </a:xfrm>
           <a:prstGeom prst="rect">
             <a:avLst/>
@@ -13300,7 +13269,7 @@
           </a:bodyPr>
           <a:lstStyle/>
           <a:p>
-            <a:pPr algn="r">
+            <a:pPr algn="ctr">
               <a:lnSpc>
                 <a:spcPct val="90000"/>
               </a:lnSpc>
@@ -13316,17 +13285,17 @@
                 <a:latin typeface="Lato Light"/>
                 <a:cs typeface="Lato Light"/>
               </a:rPr>
-              <a:t>Per day</a:t>
+              <a:t>Printed In Black</a:t>
             </a:r>
           </a:p>
         </p:txBody>
       </p:sp>
       <p:sp>
         <p:nvSpPr>
-          <p:cNvPr id="33" name="TextBox 32">
+          <p:cNvPr id="29" name="TextBox 28">
             <a:extLst>
               <a:ext uri="{FF2B5EF4-FFF2-40B4-BE49-F238E27FC236}">
-                <a16:creationId xmlns:a16="http://schemas.microsoft.com/office/drawing/2014/main" id="{A0041372-36AA-4AEF-9BA7-E875F6A00173}"/>
+                <a16:creationId xmlns:a16="http://schemas.microsoft.com/office/drawing/2014/main" id="{2933E93D-41AF-4759-ACD9-37736C2E08DE}"/>
               </a:ext>
             </a:extLst>
           </p:cNvPr>
@@ -13335,8 +13304,8 @@
         </p:nvSpPr>
         <p:spPr>
           <a:xfrm>
-            <a:off x="6140186" y="1418422"/>
-            <a:ext cx="1529883" cy="517028"/>
+            <a:off x="13991490" y="2332460"/>
+            <a:ext cx="2989165" cy="517028"/>
           </a:xfrm>
           <a:prstGeom prst="rect">
             <a:avLst/>
@@ -13358,24 +13327,29 @@
               </a:spcBef>
             </a:pPr>
             <a:r>
-              <a:rPr lang="en-US" sz="2400" b="1" dirty="0">
+              <a:rPr lang="en-US" sz="2400" dirty="0">
                 <a:solidFill>
                   <a:srgbClr val="4D4D4D"/>
                 </a:solidFill>
-                <a:latin typeface="Lato Light"/>
                 <a:cs typeface="Lato Light"/>
               </a:rPr>
-              <a:t>User</a:t>
+              <a:t>Secure Print</a:t>
             </a:r>
-          </a:p>
-        </p:txBody>
-      </p:sp>
-      <p:sp>
-        <p:nvSpPr>
-          <p:cNvPr id="34" name="TextBox 33">
+            <a:endParaRPr lang="en-US" sz="2400" dirty="0">
+              <a:solidFill>
+                <a:srgbClr val="4D4D4D"/>
+              </a:solidFill>
+              <a:latin typeface="Lato Light"/>
+            </a:endParaRPr>
+          </a:p>
+        </p:txBody>
+      </p:sp>
+      <p:sp>
+        <p:nvSpPr>
+          <p:cNvPr id="30" name="TextBox 29">
             <a:extLst>
               <a:ext uri="{FF2B5EF4-FFF2-40B4-BE49-F238E27FC236}">
-                <a16:creationId xmlns:a16="http://schemas.microsoft.com/office/drawing/2014/main" id="{BF1C49D7-13B8-4ECC-A63F-9318FFE42EAC}"/>
+                <a16:creationId xmlns:a16="http://schemas.microsoft.com/office/drawing/2014/main" id="{9960A0ED-E745-4C9B-95F7-042B4283BC3B}"/>
               </a:ext>
             </a:extLst>
           </p:cNvPr>
@@ -13384,8 +13358,8 @@
         </p:nvSpPr>
         <p:spPr>
           <a:xfrm>
-            <a:off x="18578479" y="1418422"/>
-            <a:ext cx="2096037" cy="517028"/>
+            <a:off x="21796596" y="2332460"/>
+            <a:ext cx="2016013" cy="517028"/>
           </a:xfrm>
           <a:prstGeom prst="rect">
             <a:avLst/>
@@ -13398,7 +13372,7 @@
           </a:bodyPr>
           <a:lstStyle/>
           <a:p>
-            <a:pPr algn="r">
+            <a:pPr algn="ctr">
               <a:lnSpc>
                 <a:spcPct val="90000"/>
               </a:lnSpc>
@@ -13414,99 +13388,64 @@
                 <a:latin typeface="Lato Light"/>
                 <a:cs typeface="Lato Light"/>
               </a:rPr>
-              <a:t>Time range</a:t>
+              <a:t>Driver Type</a:t>
             </a:r>
           </a:p>
         </p:txBody>
       </p:sp>
       <p:sp>
         <p:nvSpPr>
-          <p:cNvPr id="14" name="Text Placeholder 2">
+          <p:cNvPr id="31" name="TextBox 30">
             <a:extLst>
               <a:ext uri="{FF2B5EF4-FFF2-40B4-BE49-F238E27FC236}">
-                <a16:creationId xmlns:a16="http://schemas.microsoft.com/office/drawing/2014/main" id="{A6F93CFA-D976-48D1-BBD5-94723C895F21}"/>
+                <a16:creationId xmlns:a16="http://schemas.microsoft.com/office/drawing/2014/main" id="{5D62C8D9-2965-4F36-8100-0919594BACB6}"/>
               </a:ext>
             </a:extLst>
           </p:cNvPr>
-          <p:cNvSpPr>
-            <a:spLocks noGrp="1"/>
-          </p:cNvSpPr>
-          <p:nvPr>
-            <p:ph type="body" sz="quarter" idx="10"/>
-          </p:nvPr>
+          <p:cNvSpPr txBox="1"/>
+          <p:nvPr/>
         </p:nvSpPr>
         <p:spPr>
           <a:xfrm>
-            <a:off x="10133545" y="5115180"/>
-            <a:ext cx="4159250" cy="4159250"/>
-          </a:xfrm>
-        </p:spPr>
-        <p:txBody>
-          <a:bodyPr/>
-          <a:lstStyle/>
-          <a:p>
+            <a:off x="18053205" y="2332460"/>
+            <a:ext cx="2621312" cy="517028"/>
+          </a:xfrm>
+          <a:prstGeom prst="rect">
+            <a:avLst/>
+          </a:prstGeom>
+          <a:noFill/>
+        </p:spPr>
+        <p:txBody>
+          <a:bodyPr wrap="square" lIns="243791" tIns="91422" rIns="243791" bIns="91422" rtlCol="0">
+            <a:spAutoFit/>
+          </a:bodyPr>
+          <a:lstStyle/>
+          <a:p>
+            <a:pPr algn="ctr">
+              <a:lnSpc>
+                <a:spcPct val="90000"/>
+              </a:lnSpc>
+              <a:spcBef>
+                <a:spcPts val="2134"/>
+              </a:spcBef>
+            </a:pPr>
             <a:r>
-              <a:rPr lang="en-US" sz="19900" dirty="0">
+              <a:rPr lang="en-US" sz="2400" dirty="0">
                 <a:solidFill>
                   <a:srgbClr val="4D4D4D"/>
                 </a:solidFill>
-                <a:latin typeface="icons" panose="02000509000000000000" pitchFamily="49" charset="0"/>
+                <a:latin typeface="Lato Light"/>
+                <a:cs typeface="Lato Light"/>
               </a:rPr>
-              <a:t>q</a:t>
+              <a:t>Job States</a:t>
             </a:r>
-            <a:endParaRPr lang="en-US" sz="19900" dirty="0">
-              <a:solidFill>
-                <a:srgbClr val="4D4D4D"/>
-              </a:solidFill>
-            </a:endParaRPr>
-          </a:p>
-        </p:txBody>
-      </p:sp>
-      <p:cxnSp>
-        <p:nvCxnSpPr>
-          <p:cNvPr id="15" name="Straight Connector 14">
-            <a:extLst>
-              <a:ext uri="{FF2B5EF4-FFF2-40B4-BE49-F238E27FC236}">
-                <a16:creationId xmlns:a16="http://schemas.microsoft.com/office/drawing/2014/main" id="{5FD846E3-7E0D-47F7-BE14-A04A874856A3}"/>
-              </a:ext>
-            </a:extLst>
-          </p:cNvPr>
-          <p:cNvCxnSpPr/>
-          <p:nvPr/>
-        </p:nvCxnSpPr>
-        <p:spPr>
-          <a:xfrm rot="5400000">
-            <a:off x="12250307" y="1529002"/>
-            <a:ext cx="0" cy="1313401"/>
-          </a:xfrm>
-          <a:prstGeom prst="line">
-            <a:avLst/>
-          </a:prstGeom>
-          <a:ln w="38100" cmpd="sng">
-            <a:solidFill>
-              <a:srgbClr val="4D4D4D"/>
-            </a:solidFill>
-          </a:ln>
-        </p:spPr>
-        <p:style>
-          <a:lnRef idx="2">
-            <a:schemeClr val="accent1"/>
-          </a:lnRef>
-          <a:fillRef idx="0">
-            <a:schemeClr val="accent1"/>
-          </a:fillRef>
-          <a:effectRef idx="1">
-            <a:schemeClr val="accent1"/>
-          </a:effectRef>
-          <a:fontRef idx="minor">
-            <a:schemeClr val="tx1"/>
-          </a:fontRef>
-        </p:style>
-      </p:cxnSp>
+          </a:p>
+        </p:txBody>
+      </p:sp>
     </p:spTree>
     <p:extLst>
       <p:ext uri="{BB962C8B-B14F-4D97-AF65-F5344CB8AC3E}">
-        <p14:creationId xmlns:p14="http://schemas.microsoft.com/office/powerpoint/2010/main" val="250206617"/>
+        <p14:creationId xmlns:p14="http://schemas.microsoft.com/office/powerpoint/2010/main" val="3213131689"/>
       </p:ext>
     </p:extLst>
   </p:cSld>

</xml_diff>

<commit_message>
Updated PPTX and png images with new "Printers - Service Status" slides
- Added slide7.png "Printers - Service Status"
</commit_message>
<xml_diff>
--- a/PowerPoint/PrintixPowerBIDesign.pptx
+++ b/PowerPoint/PrintixPowerBIDesign.pptx
@@ -5,7 +5,7 @@
     <p:sldMasterId id="2147483648" r:id="rId1"/>
   </p:sldMasterIdLst>
   <p:notesMasterIdLst>
-    <p:notesMasterId r:id="rId16"/>
+    <p:notesMasterId r:id="rId17"/>
   </p:notesMasterIdLst>
   <p:sldIdLst>
     <p:sldId id="271" r:id="rId2"/>
@@ -14,14 +14,15 @@
     <p:sldId id="275" r:id="rId5"/>
     <p:sldId id="277" r:id="rId6"/>
     <p:sldId id="279" r:id="rId7"/>
-    <p:sldId id="290" r:id="rId8"/>
-    <p:sldId id="283" r:id="rId9"/>
-    <p:sldId id="292" r:id="rId10"/>
-    <p:sldId id="284" r:id="rId11"/>
-    <p:sldId id="291" r:id="rId12"/>
-    <p:sldId id="287" r:id="rId13"/>
-    <p:sldId id="285" r:id="rId14"/>
-    <p:sldId id="286" r:id="rId15"/>
+    <p:sldId id="293" r:id="rId8"/>
+    <p:sldId id="290" r:id="rId9"/>
+    <p:sldId id="283" r:id="rId10"/>
+    <p:sldId id="292" r:id="rId11"/>
+    <p:sldId id="284" r:id="rId12"/>
+    <p:sldId id="291" r:id="rId13"/>
+    <p:sldId id="287" r:id="rId14"/>
+    <p:sldId id="285" r:id="rId15"/>
+    <p:sldId id="286" r:id="rId16"/>
   </p:sldIdLst>
   <p:sldSz cx="24377650" cy="13716000"/>
   <p:notesSz cx="6858000" cy="9144000"/>
@@ -149,6 +150,11 @@
             <p14:sldId id="279"/>
           </p14:sldIdLst>
         </p14:section>
+        <p14:section name="Printers - Service Status" id="{E8FD19BE-BAF3-48E4-A896-2FBE1A8B3A3F}">
+          <p14:sldIdLst>
+            <p14:sldId id="293"/>
+          </p14:sldIdLst>
+        </p14:section>
         <p14:section name="Locations - Overview" id="{FE1EA1CD-9151-4730-AADC-C1DF26D4BC9F}">
           <p14:sldIdLst>
             <p14:sldId id="290"/>
@@ -314,7 +320,7 @@
             <a:fld id="{EFC10EE1-B198-C942-8235-326C972CBB30}" type="datetimeFigureOut">
               <a:rPr lang="en-US" smtClean="0"/>
               <a:pPr/>
-              <a:t>12/27/2018</a:t>
+              <a:t>5/24/2019</a:t>
             </a:fld>
             <a:endParaRPr lang="en-US" dirty="0"/>
           </a:p>
@@ -2347,8 +2353,8 @@
         </p:nvSpPr>
         <p:spPr>
           <a:xfrm>
-            <a:off x="9568228" y="741286"/>
-            <a:ext cx="5364162" cy="830997"/>
+            <a:off x="9591571" y="738196"/>
+            <a:ext cx="5317481" cy="830997"/>
           </a:xfrm>
           <a:prstGeom prst="rect">
             <a:avLst/>
@@ -2367,20 +2373,486 @@
                 <a:solidFill>
                   <a:srgbClr val="4D4D4D"/>
                 </a:solidFill>
+                <a:cs typeface="Lato Light"/>
+              </a:rPr>
+              <a:t>User – Print Details</a:t>
+            </a:r>
+          </a:p>
+        </p:txBody>
+      </p:sp>
+      <p:sp>
+        <p:nvSpPr>
+          <p:cNvPr id="27" name="TextBox 26">
+            <a:extLst>
+              <a:ext uri="{FF2B5EF4-FFF2-40B4-BE49-F238E27FC236}">
+                <a16:creationId xmlns:a16="http://schemas.microsoft.com/office/drawing/2014/main" id="{3A3344D4-F57B-4C8C-89C2-E4521BF1CAB3}"/>
+              </a:ext>
+            </a:extLst>
+          </p:cNvPr>
+          <p:cNvSpPr txBox="1"/>
+          <p:nvPr/>
+        </p:nvSpPr>
+        <p:spPr>
+          <a:xfrm>
+            <a:off x="347988" y="2326644"/>
+            <a:ext cx="2989165" cy="517028"/>
+          </a:xfrm>
+          <a:prstGeom prst="rect">
+            <a:avLst/>
+          </a:prstGeom>
+          <a:noFill/>
+        </p:spPr>
+        <p:txBody>
+          <a:bodyPr wrap="square" lIns="243791" tIns="91422" rIns="243791" bIns="91422" rtlCol="0">
+            <a:spAutoFit/>
+          </a:bodyPr>
+          <a:lstStyle/>
+          <a:p>
+            <a:pPr algn="ctr">
+              <a:lnSpc>
+                <a:spcPct val="90000"/>
+              </a:lnSpc>
+              <a:spcBef>
+                <a:spcPts val="2134"/>
+              </a:spcBef>
+            </a:pPr>
+            <a:r>
+              <a:rPr lang="en-US" sz="2400" dirty="0">
+                <a:solidFill>
+                  <a:srgbClr val="4D4D4D"/>
+                </a:solidFill>
+                <a:cs typeface="Lato Light"/>
+              </a:rPr>
+              <a:t>Printed 2-sided</a:t>
+            </a:r>
+            <a:endParaRPr lang="en-US" sz="2400" dirty="0">
+              <a:solidFill>
+                <a:srgbClr val="4D4D4D"/>
+              </a:solidFill>
+              <a:latin typeface="Lato Light"/>
+            </a:endParaRPr>
+          </a:p>
+        </p:txBody>
+      </p:sp>
+      <p:sp>
+        <p:nvSpPr>
+          <p:cNvPr id="114" name="TextBox 113">
+            <a:extLst>
+              <a:ext uri="{FF2B5EF4-FFF2-40B4-BE49-F238E27FC236}">
+                <a16:creationId xmlns:a16="http://schemas.microsoft.com/office/drawing/2014/main" id="{2A327888-FDAE-4BFF-9470-5E94C5B0315E}"/>
+              </a:ext>
+            </a:extLst>
+          </p:cNvPr>
+          <p:cNvSpPr txBox="1"/>
+          <p:nvPr/>
+        </p:nvSpPr>
+        <p:spPr>
+          <a:xfrm>
+            <a:off x="14292795" y="8394066"/>
+            <a:ext cx="2989165" cy="517028"/>
+          </a:xfrm>
+          <a:prstGeom prst="rect">
+            <a:avLst/>
+          </a:prstGeom>
+          <a:noFill/>
+        </p:spPr>
+        <p:txBody>
+          <a:bodyPr wrap="square" lIns="243791" tIns="91422" rIns="243791" bIns="91422" rtlCol="0">
+            <a:spAutoFit/>
+          </a:bodyPr>
+          <a:lstStyle/>
+          <a:p>
+            <a:pPr algn="r">
+              <a:lnSpc>
+                <a:spcPct val="90000"/>
+              </a:lnSpc>
+              <a:spcBef>
+                <a:spcPts val="2134"/>
+              </a:spcBef>
+            </a:pPr>
+            <a:r>
+              <a:rPr lang="en-US" sz="2400">
+                <a:solidFill>
+                  <a:srgbClr val="4D4D4D"/>
+                </a:solidFill>
+                <a:cs typeface="Lato Light"/>
+              </a:rPr>
+              <a:t>Workstations</a:t>
+            </a:r>
+            <a:endParaRPr lang="en-US" sz="2400" dirty="0">
+              <a:solidFill>
+                <a:srgbClr val="4D4D4D"/>
+              </a:solidFill>
+              <a:cs typeface="Lato Light"/>
+            </a:endParaRPr>
+          </a:p>
+        </p:txBody>
+      </p:sp>
+      <p:sp>
+        <p:nvSpPr>
+          <p:cNvPr id="24" name="TextBox 23">
+            <a:extLst>
+              <a:ext uri="{FF2B5EF4-FFF2-40B4-BE49-F238E27FC236}">
+                <a16:creationId xmlns:a16="http://schemas.microsoft.com/office/drawing/2014/main" id="{8A36327E-1820-43E3-9996-1C119EB929D2}"/>
+              </a:ext>
+            </a:extLst>
+          </p:cNvPr>
+          <p:cNvSpPr txBox="1"/>
+          <p:nvPr/>
+        </p:nvSpPr>
+        <p:spPr>
+          <a:xfrm>
+            <a:off x="11423883" y="1553507"/>
+            <a:ext cx="1529883" cy="517028"/>
+          </a:xfrm>
+          <a:prstGeom prst="rect">
+            <a:avLst/>
+          </a:prstGeom>
+          <a:noFill/>
+        </p:spPr>
+        <p:txBody>
+          <a:bodyPr wrap="square" lIns="243791" tIns="91422" rIns="243791" bIns="91422" rtlCol="0">
+            <a:spAutoFit/>
+          </a:bodyPr>
+          <a:lstStyle/>
+          <a:p>
+            <a:pPr algn="r">
+              <a:lnSpc>
+                <a:spcPct val="90000"/>
+              </a:lnSpc>
+              <a:spcBef>
+                <a:spcPts val="2134"/>
+              </a:spcBef>
+            </a:pPr>
+            <a:r>
+              <a:rPr lang="en-US" sz="2400" dirty="0">
+                <a:solidFill>
+                  <a:srgbClr val="4D4D4D"/>
+                </a:solidFill>
                 <a:latin typeface="Lato Light"/>
                 <a:cs typeface="Lato Light"/>
               </a:rPr>
-              <a:t>Queues - Overview</a:t>
+              <a:t>Per day</a:t>
             </a:r>
+          </a:p>
+        </p:txBody>
+      </p:sp>
+      <p:sp>
+        <p:nvSpPr>
+          <p:cNvPr id="20" name="TextBox 19">
+            <a:extLst>
+              <a:ext uri="{FF2B5EF4-FFF2-40B4-BE49-F238E27FC236}">
+                <a16:creationId xmlns:a16="http://schemas.microsoft.com/office/drawing/2014/main" id="{AE403E1A-98EF-4F68-9851-97F19A0770E3}"/>
+              </a:ext>
+            </a:extLst>
+          </p:cNvPr>
+          <p:cNvSpPr txBox="1"/>
+          <p:nvPr/>
+        </p:nvSpPr>
+        <p:spPr>
+          <a:xfrm>
+            <a:off x="8079318" y="2326644"/>
+            <a:ext cx="2016013" cy="517028"/>
+          </a:xfrm>
+          <a:prstGeom prst="rect">
+            <a:avLst/>
+          </a:prstGeom>
+          <a:noFill/>
+        </p:spPr>
+        <p:txBody>
+          <a:bodyPr wrap="square" lIns="243791" tIns="91422" rIns="243791" bIns="91422" rtlCol="0">
+            <a:spAutoFit/>
+          </a:bodyPr>
+          <a:lstStyle/>
+          <a:p>
+            <a:pPr algn="ctr">
+              <a:lnSpc>
+                <a:spcPct val="90000"/>
+              </a:lnSpc>
+              <a:spcBef>
+                <a:spcPts val="2134"/>
+              </a:spcBef>
+            </a:pPr>
+            <a:r>
+              <a:rPr lang="en-US" sz="2400" dirty="0">
+                <a:solidFill>
+                  <a:srgbClr val="4D4D4D"/>
+                </a:solidFill>
+                <a:latin typeface="Lato Light"/>
+                <a:cs typeface="Lato Light"/>
+              </a:rPr>
+              <a:t>Paper Size</a:t>
+            </a:r>
+          </a:p>
+        </p:txBody>
+      </p:sp>
+      <p:sp>
+        <p:nvSpPr>
+          <p:cNvPr id="25" name="TextBox 24">
+            <a:extLst>
+              <a:ext uri="{FF2B5EF4-FFF2-40B4-BE49-F238E27FC236}">
+                <a16:creationId xmlns:a16="http://schemas.microsoft.com/office/drawing/2014/main" id="{B2A3DF0A-4D35-4B9A-8618-665328380448}"/>
+              </a:ext>
+            </a:extLst>
+          </p:cNvPr>
+          <p:cNvSpPr txBox="1"/>
+          <p:nvPr/>
+        </p:nvSpPr>
+        <p:spPr>
+          <a:xfrm>
+            <a:off x="-488624" y="8394066"/>
+            <a:ext cx="2989165" cy="517028"/>
+          </a:xfrm>
+          <a:prstGeom prst="rect">
+            <a:avLst/>
+          </a:prstGeom>
+          <a:noFill/>
+        </p:spPr>
+        <p:txBody>
+          <a:bodyPr wrap="square" lIns="243791" tIns="91422" rIns="243791" bIns="91422" rtlCol="0">
+            <a:spAutoFit/>
+          </a:bodyPr>
+          <a:lstStyle/>
+          <a:p>
+            <a:pPr algn="r">
+              <a:lnSpc>
+                <a:spcPct val="90000"/>
+              </a:lnSpc>
+              <a:spcBef>
+                <a:spcPts val="2134"/>
+              </a:spcBef>
+            </a:pPr>
+            <a:r>
+              <a:rPr lang="en-US" sz="2400" dirty="0">
+                <a:solidFill>
+                  <a:srgbClr val="4D4D4D"/>
+                </a:solidFill>
+                <a:latin typeface="Lato Light"/>
+                <a:cs typeface="Lato Light"/>
+              </a:rPr>
+              <a:t>Total Sheets</a:t>
+            </a:r>
+          </a:p>
+        </p:txBody>
+      </p:sp>
+      <p:sp>
+        <p:nvSpPr>
+          <p:cNvPr id="23" name="Text Placeholder 2">
+            <a:extLst>
+              <a:ext uri="{FF2B5EF4-FFF2-40B4-BE49-F238E27FC236}">
+                <a16:creationId xmlns:a16="http://schemas.microsoft.com/office/drawing/2014/main" id="{99ABAAAA-8C7C-4A1A-9C77-7FF06C773C7E}"/>
+              </a:ext>
+            </a:extLst>
+          </p:cNvPr>
+          <p:cNvSpPr txBox="1">
+            <a:spLocks/>
+          </p:cNvSpPr>
+          <p:nvPr/>
+        </p:nvSpPr>
+        <p:spPr>
+          <a:xfrm>
+            <a:off x="10133545" y="5115180"/>
+            <a:ext cx="4159250" cy="4159250"/>
+          </a:xfrm>
+          <a:prstGeom prst="rect">
+            <a:avLst/>
+          </a:prstGeom>
+        </p:spPr>
+        <p:txBody>
+          <a:bodyPr anchor="ctr" anchorCtr="1"/>
+          <a:lstStyle>
+            <a:lvl1pPr marL="0" indent="0" algn="l" defTabSz="1828434" rtl="0" eaLnBrk="1" latinLnBrk="0" hangingPunct="1">
+              <a:lnSpc>
+                <a:spcPct val="90000"/>
+              </a:lnSpc>
+              <a:spcBef>
+                <a:spcPts val="2000"/>
+              </a:spcBef>
+              <a:buFont typeface="Arial" panose="020B0604020202020204" pitchFamily="34" charset="0"/>
+              <a:buNone/>
+              <a:defRPr lang="en-US" sz="4800" kern="1200" dirty="0" smtClean="0">
+                <a:solidFill>
+                  <a:schemeClr val="tx1"/>
+                </a:solidFill>
+                <a:effectLst/>
+                <a:latin typeface="Lato Light"/>
+                <a:ea typeface="+mn-ea"/>
+                <a:cs typeface="Lato Light"/>
+              </a:defRPr>
+            </a:lvl1pPr>
+            <a:lvl2pPr marL="914217" indent="0" algn="l" defTabSz="1828434" rtl="0" eaLnBrk="1" latinLnBrk="0" hangingPunct="1">
+              <a:lnSpc>
+                <a:spcPct val="90000"/>
+              </a:lnSpc>
+              <a:spcBef>
+                <a:spcPts val="1000"/>
+              </a:spcBef>
+              <a:buFont typeface="Arial" panose="020B0604020202020204" pitchFamily="34" charset="0"/>
+              <a:buNone/>
+              <a:defRPr lang="en-US" sz="4000" kern="1200" dirty="0" smtClean="0">
+                <a:solidFill>
+                  <a:schemeClr val="tx1"/>
+                </a:solidFill>
+                <a:effectLst/>
+                <a:latin typeface="Lato Light"/>
+                <a:ea typeface="+mn-ea"/>
+                <a:cs typeface="Lato Light"/>
+              </a:defRPr>
+            </a:lvl2pPr>
+            <a:lvl3pPr marL="1828434" indent="0" algn="l" defTabSz="1828434" rtl="0" eaLnBrk="1" latinLnBrk="0" hangingPunct="1">
+              <a:lnSpc>
+                <a:spcPct val="90000"/>
+              </a:lnSpc>
+              <a:spcBef>
+                <a:spcPts val="1000"/>
+              </a:spcBef>
+              <a:buFont typeface="Arial" panose="020B0604020202020204" pitchFamily="34" charset="0"/>
+              <a:buNone/>
+              <a:defRPr lang="en-US" sz="3600" kern="1200" dirty="0" smtClean="0">
+                <a:solidFill>
+                  <a:schemeClr val="tx1"/>
+                </a:solidFill>
+                <a:effectLst/>
+                <a:latin typeface="Lato Light"/>
+                <a:ea typeface="+mn-ea"/>
+                <a:cs typeface="Lato Light"/>
+              </a:defRPr>
+            </a:lvl3pPr>
+            <a:lvl4pPr marL="2742651" indent="0" algn="l" defTabSz="1828434" rtl="0" eaLnBrk="1" latinLnBrk="0" hangingPunct="1">
+              <a:lnSpc>
+                <a:spcPct val="90000"/>
+              </a:lnSpc>
+              <a:spcBef>
+                <a:spcPts val="1000"/>
+              </a:spcBef>
+              <a:buFont typeface="Arial" panose="020B0604020202020204" pitchFamily="34" charset="0"/>
+              <a:buNone/>
+              <a:defRPr lang="en-US" sz="3200" kern="1200" dirty="0" smtClean="0">
+                <a:solidFill>
+                  <a:schemeClr val="tx1"/>
+                </a:solidFill>
+                <a:effectLst/>
+                <a:latin typeface="Lato Light"/>
+                <a:ea typeface="+mn-ea"/>
+                <a:cs typeface="Lato Light"/>
+              </a:defRPr>
+            </a:lvl4pPr>
+            <a:lvl5pPr marL="3656868" indent="0" algn="l" defTabSz="1828434" rtl="0" eaLnBrk="1" latinLnBrk="0" hangingPunct="1">
+              <a:lnSpc>
+                <a:spcPct val="90000"/>
+              </a:lnSpc>
+              <a:spcBef>
+                <a:spcPts val="1000"/>
+              </a:spcBef>
+              <a:buFont typeface="Arial" panose="020B0604020202020204" pitchFamily="34" charset="0"/>
+              <a:buNone/>
+              <a:defRPr lang="en-US" sz="3200" kern="1200" dirty="0">
+                <a:solidFill>
+                  <a:schemeClr val="tx1"/>
+                </a:solidFill>
+                <a:effectLst/>
+                <a:latin typeface="Lato Light"/>
+                <a:ea typeface="+mn-ea"/>
+                <a:cs typeface="Lato Light"/>
+              </a:defRPr>
+            </a:lvl5pPr>
+            <a:lvl6pPr marL="5028194" indent="-457109" algn="l" defTabSz="1828434" rtl="0" eaLnBrk="1" latinLnBrk="0" hangingPunct="1">
+              <a:lnSpc>
+                <a:spcPct val="90000"/>
+              </a:lnSpc>
+              <a:spcBef>
+                <a:spcPts val="1000"/>
+              </a:spcBef>
+              <a:buFont typeface="Arial" panose="020B0604020202020204" pitchFamily="34" charset="0"/>
+              <a:buChar char="•"/>
+              <a:defRPr sz="3600" kern="1200">
+                <a:solidFill>
+                  <a:schemeClr val="tx1"/>
+                </a:solidFill>
+                <a:latin typeface="+mn-lt"/>
+                <a:ea typeface="+mn-ea"/>
+                <a:cs typeface="+mn-cs"/>
+              </a:defRPr>
+            </a:lvl6pPr>
+            <a:lvl7pPr marL="5942411" indent="-457109" algn="l" defTabSz="1828434" rtl="0" eaLnBrk="1" latinLnBrk="0" hangingPunct="1">
+              <a:lnSpc>
+                <a:spcPct val="90000"/>
+              </a:lnSpc>
+              <a:spcBef>
+                <a:spcPts val="1000"/>
+              </a:spcBef>
+              <a:buFont typeface="Arial" panose="020B0604020202020204" pitchFamily="34" charset="0"/>
+              <a:buChar char="•"/>
+              <a:defRPr sz="3600" kern="1200">
+                <a:solidFill>
+                  <a:schemeClr val="tx1"/>
+                </a:solidFill>
+                <a:latin typeface="+mn-lt"/>
+                <a:ea typeface="+mn-ea"/>
+                <a:cs typeface="+mn-cs"/>
+              </a:defRPr>
+            </a:lvl7pPr>
+            <a:lvl8pPr marL="6856628" indent="-457109" algn="l" defTabSz="1828434" rtl="0" eaLnBrk="1" latinLnBrk="0" hangingPunct="1">
+              <a:lnSpc>
+                <a:spcPct val="90000"/>
+              </a:lnSpc>
+              <a:spcBef>
+                <a:spcPts val="1000"/>
+              </a:spcBef>
+              <a:buFont typeface="Arial" panose="020B0604020202020204" pitchFamily="34" charset="0"/>
+              <a:buChar char="•"/>
+              <a:defRPr sz="3600" kern="1200">
+                <a:solidFill>
+                  <a:schemeClr val="tx1"/>
+                </a:solidFill>
+                <a:latin typeface="+mn-lt"/>
+                <a:ea typeface="+mn-ea"/>
+                <a:cs typeface="+mn-cs"/>
+              </a:defRPr>
+            </a:lvl8pPr>
+            <a:lvl9pPr marL="7770846" indent="-457109" algn="l" defTabSz="1828434" rtl="0" eaLnBrk="1" latinLnBrk="0" hangingPunct="1">
+              <a:lnSpc>
+                <a:spcPct val="90000"/>
+              </a:lnSpc>
+              <a:spcBef>
+                <a:spcPts val="1000"/>
+              </a:spcBef>
+              <a:buFont typeface="Arial" panose="020B0604020202020204" pitchFamily="34" charset="0"/>
+              <a:buChar char="•"/>
+              <a:defRPr sz="3600" kern="1200">
+                <a:solidFill>
+                  <a:schemeClr val="tx1"/>
+                </a:solidFill>
+                <a:latin typeface="+mn-lt"/>
+                <a:ea typeface="+mn-ea"/>
+                <a:cs typeface="+mn-cs"/>
+              </a:defRPr>
+            </a:lvl9pPr>
+          </a:lstStyle>
+          <a:p>
+            <a:r>
+              <a:rPr lang="nb-NO" sz="19900" dirty="0">
+                <a:solidFill>
+                  <a:srgbClr val="4D4D4D"/>
+                </a:solidFill>
+                <a:latin typeface="icons" panose="02000509000000000000" pitchFamily="49" charset="0"/>
+              </a:rPr>
+              <a:t>6</a:t>
+            </a:r>
+            <a:endParaRPr lang="nb-NO" sz="71400" dirty="0">
+              <a:solidFill>
+                <a:srgbClr val="4D4D4D"/>
+              </a:solidFill>
+            </a:endParaRPr>
           </a:p>
         </p:txBody>
       </p:sp>
       <p:cxnSp>
         <p:nvCxnSpPr>
-          <p:cNvPr id="7" name="Straight Connector 6">
+          <p:cNvPr id="26" name="Straight Connector 25">
             <a:extLst>
               <a:ext uri="{FF2B5EF4-FFF2-40B4-BE49-F238E27FC236}">
-                <a16:creationId xmlns:a16="http://schemas.microsoft.com/office/drawing/2014/main" id="{EE169823-7EE0-4E97-9F46-FCE273CAF355}"/>
+                <a16:creationId xmlns:a16="http://schemas.microsoft.com/office/drawing/2014/main" id="{7BFEC2E0-0EB6-4BF0-A7AC-89811187E19A}"/>
               </a:ext>
             </a:extLst>
           </p:cNvPr>
@@ -2416,10 +2888,211 @@
           </a:fontRef>
         </p:style>
       </p:cxnSp>
+      <p:sp>
+        <p:nvSpPr>
+          <p:cNvPr id="28" name="TextBox 27">
+            <a:extLst>
+              <a:ext uri="{FF2B5EF4-FFF2-40B4-BE49-F238E27FC236}">
+                <a16:creationId xmlns:a16="http://schemas.microsoft.com/office/drawing/2014/main" id="{B0ACC797-27DB-4524-8768-4343688BAFE6}"/>
+              </a:ext>
+            </a:extLst>
+          </p:cNvPr>
+          <p:cNvSpPr txBox="1"/>
+          <p:nvPr/>
+        </p:nvSpPr>
+        <p:spPr>
+          <a:xfrm>
+            <a:off x="4283814" y="2326644"/>
+            <a:ext cx="2949497" cy="517028"/>
+          </a:xfrm>
+          <a:prstGeom prst="rect">
+            <a:avLst/>
+          </a:prstGeom>
+          <a:noFill/>
+        </p:spPr>
+        <p:txBody>
+          <a:bodyPr wrap="square" lIns="243791" tIns="91422" rIns="243791" bIns="91422" rtlCol="0">
+            <a:spAutoFit/>
+          </a:bodyPr>
+          <a:lstStyle/>
+          <a:p>
+            <a:pPr algn="ctr">
+              <a:lnSpc>
+                <a:spcPct val="90000"/>
+              </a:lnSpc>
+              <a:spcBef>
+                <a:spcPts val="2134"/>
+              </a:spcBef>
+            </a:pPr>
+            <a:r>
+              <a:rPr lang="en-US" sz="2400" dirty="0">
+                <a:solidFill>
+                  <a:srgbClr val="4D4D4D"/>
+                </a:solidFill>
+                <a:latin typeface="Lato Light"/>
+                <a:cs typeface="Lato Light"/>
+              </a:rPr>
+              <a:t>Printed In Black</a:t>
+            </a:r>
+          </a:p>
+        </p:txBody>
+      </p:sp>
+      <p:sp>
+        <p:nvSpPr>
+          <p:cNvPr id="29" name="TextBox 28">
+            <a:extLst>
+              <a:ext uri="{FF2B5EF4-FFF2-40B4-BE49-F238E27FC236}">
+                <a16:creationId xmlns:a16="http://schemas.microsoft.com/office/drawing/2014/main" id="{2933E93D-41AF-4759-ACD9-37736C2E08DE}"/>
+              </a:ext>
+            </a:extLst>
+          </p:cNvPr>
+          <p:cNvSpPr txBox="1"/>
+          <p:nvPr/>
+        </p:nvSpPr>
+        <p:spPr>
+          <a:xfrm>
+            <a:off x="13991490" y="2332460"/>
+            <a:ext cx="2989165" cy="517028"/>
+          </a:xfrm>
+          <a:prstGeom prst="rect">
+            <a:avLst/>
+          </a:prstGeom>
+          <a:noFill/>
+        </p:spPr>
+        <p:txBody>
+          <a:bodyPr wrap="square" lIns="243791" tIns="91422" rIns="243791" bIns="91422" rtlCol="0">
+            <a:spAutoFit/>
+          </a:bodyPr>
+          <a:lstStyle/>
+          <a:p>
+            <a:pPr algn="ctr">
+              <a:lnSpc>
+                <a:spcPct val="90000"/>
+              </a:lnSpc>
+              <a:spcBef>
+                <a:spcPts val="2134"/>
+              </a:spcBef>
+            </a:pPr>
+            <a:r>
+              <a:rPr lang="en-US" sz="2400" dirty="0">
+                <a:solidFill>
+                  <a:srgbClr val="4D4D4D"/>
+                </a:solidFill>
+                <a:cs typeface="Lato Light"/>
+              </a:rPr>
+              <a:t>Secure Print</a:t>
+            </a:r>
+            <a:endParaRPr lang="en-US" sz="2400" dirty="0">
+              <a:solidFill>
+                <a:srgbClr val="4D4D4D"/>
+              </a:solidFill>
+              <a:latin typeface="Lato Light"/>
+            </a:endParaRPr>
+          </a:p>
+        </p:txBody>
+      </p:sp>
+      <p:sp>
+        <p:nvSpPr>
+          <p:cNvPr id="30" name="TextBox 29">
+            <a:extLst>
+              <a:ext uri="{FF2B5EF4-FFF2-40B4-BE49-F238E27FC236}">
+                <a16:creationId xmlns:a16="http://schemas.microsoft.com/office/drawing/2014/main" id="{9960A0ED-E745-4C9B-95F7-042B4283BC3B}"/>
+              </a:ext>
+            </a:extLst>
+          </p:cNvPr>
+          <p:cNvSpPr txBox="1"/>
+          <p:nvPr/>
+        </p:nvSpPr>
+        <p:spPr>
+          <a:xfrm>
+            <a:off x="21796596" y="2332460"/>
+            <a:ext cx="2016013" cy="517028"/>
+          </a:xfrm>
+          <a:prstGeom prst="rect">
+            <a:avLst/>
+          </a:prstGeom>
+          <a:noFill/>
+        </p:spPr>
+        <p:txBody>
+          <a:bodyPr wrap="square" lIns="243791" tIns="91422" rIns="243791" bIns="91422" rtlCol="0">
+            <a:spAutoFit/>
+          </a:bodyPr>
+          <a:lstStyle/>
+          <a:p>
+            <a:pPr algn="ctr">
+              <a:lnSpc>
+                <a:spcPct val="90000"/>
+              </a:lnSpc>
+              <a:spcBef>
+                <a:spcPts val="2134"/>
+              </a:spcBef>
+            </a:pPr>
+            <a:r>
+              <a:rPr lang="en-US" sz="2400" dirty="0">
+                <a:solidFill>
+                  <a:srgbClr val="4D4D4D"/>
+                </a:solidFill>
+                <a:latin typeface="Lato Light"/>
+                <a:cs typeface="Lato Light"/>
+              </a:rPr>
+              <a:t>Driver Type</a:t>
+            </a:r>
+          </a:p>
+        </p:txBody>
+      </p:sp>
+      <p:sp>
+        <p:nvSpPr>
+          <p:cNvPr id="31" name="TextBox 30">
+            <a:extLst>
+              <a:ext uri="{FF2B5EF4-FFF2-40B4-BE49-F238E27FC236}">
+                <a16:creationId xmlns:a16="http://schemas.microsoft.com/office/drawing/2014/main" id="{5D62C8D9-2965-4F36-8100-0919594BACB6}"/>
+              </a:ext>
+            </a:extLst>
+          </p:cNvPr>
+          <p:cNvSpPr txBox="1"/>
+          <p:nvPr/>
+        </p:nvSpPr>
+        <p:spPr>
+          <a:xfrm>
+            <a:off x="18053205" y="2332460"/>
+            <a:ext cx="2621312" cy="517028"/>
+          </a:xfrm>
+          <a:prstGeom prst="rect">
+            <a:avLst/>
+          </a:prstGeom>
+          <a:noFill/>
+        </p:spPr>
+        <p:txBody>
+          <a:bodyPr wrap="square" lIns="243791" tIns="91422" rIns="243791" bIns="91422" rtlCol="0">
+            <a:spAutoFit/>
+          </a:bodyPr>
+          <a:lstStyle/>
+          <a:p>
+            <a:pPr algn="ctr">
+              <a:lnSpc>
+                <a:spcPct val="90000"/>
+              </a:lnSpc>
+              <a:spcBef>
+                <a:spcPts val="2134"/>
+              </a:spcBef>
+            </a:pPr>
+            <a:r>
+              <a:rPr lang="en-US" sz="2400" dirty="0">
+                <a:solidFill>
+                  <a:srgbClr val="4D4D4D"/>
+                </a:solidFill>
+                <a:latin typeface="Lato Light"/>
+                <a:cs typeface="Lato Light"/>
+              </a:rPr>
+              <a:t>Job States</a:t>
+            </a:r>
+          </a:p>
+        </p:txBody>
+      </p:sp>
     </p:spTree>
     <p:extLst>
       <p:ext uri="{BB962C8B-B14F-4D97-AF65-F5344CB8AC3E}">
-        <p14:creationId xmlns:p14="http://schemas.microsoft.com/office/powerpoint/2010/main" val="826006346"/>
+        <p14:creationId xmlns:p14="http://schemas.microsoft.com/office/powerpoint/2010/main" val="3213131689"/>
       </p:ext>
     </p:extLst>
   </p:cSld>
@@ -2571,8 +3244,8 @@
         </p:nvSpPr>
         <p:spPr>
           <a:xfrm>
-            <a:off x="10334563" y="741286"/>
-            <a:ext cx="3831497" cy="830997"/>
+            <a:off x="9568228" y="741286"/>
+            <a:ext cx="5364162" cy="830997"/>
           </a:xfrm>
           <a:prstGeom prst="rect">
             <a:avLst/>
@@ -2587,14 +3260,14 @@
           <a:p>
             <a:pPr algn="ctr"/>
             <a:r>
-              <a:rPr lang="en-US" sz="4800">
+              <a:rPr lang="en-US" sz="4800" dirty="0">
                 <a:solidFill>
                   <a:srgbClr val="4D4D4D"/>
                 </a:solidFill>
                 <a:latin typeface="Lato Light"/>
                 <a:cs typeface="Lato Light"/>
               </a:rPr>
-              <a:t>Job – Historic</a:t>
+              <a:t>Queues - Overview</a:t>
             </a:r>
           </a:p>
         </p:txBody>
@@ -2643,7 +3316,7 @@
     </p:spTree>
     <p:extLst>
       <p:ext uri="{BB962C8B-B14F-4D97-AF65-F5344CB8AC3E}">
-        <p14:creationId xmlns:p14="http://schemas.microsoft.com/office/powerpoint/2010/main" val="921920859"/>
+        <p14:creationId xmlns:p14="http://schemas.microsoft.com/office/powerpoint/2010/main" val="826006346"/>
       </p:ext>
     </p:extLst>
   </p:cSld>
@@ -2795,6 +3468,230 @@
         </p:nvSpPr>
         <p:spPr>
           <a:xfrm>
+            <a:off x="10334563" y="741286"/>
+            <a:ext cx="3831497" cy="830997"/>
+          </a:xfrm>
+          <a:prstGeom prst="rect">
+            <a:avLst/>
+          </a:prstGeom>
+          <a:noFill/>
+        </p:spPr>
+        <p:txBody>
+          <a:bodyPr wrap="none" rtlCol="0">
+            <a:spAutoFit/>
+          </a:bodyPr>
+          <a:lstStyle/>
+          <a:p>
+            <a:pPr algn="ctr"/>
+            <a:r>
+              <a:rPr lang="en-US" sz="4800">
+                <a:solidFill>
+                  <a:srgbClr val="4D4D4D"/>
+                </a:solidFill>
+                <a:latin typeface="Lato Light"/>
+                <a:cs typeface="Lato Light"/>
+              </a:rPr>
+              <a:t>Job – Historic</a:t>
+            </a:r>
+          </a:p>
+        </p:txBody>
+      </p:sp>
+      <p:cxnSp>
+        <p:nvCxnSpPr>
+          <p:cNvPr id="7" name="Straight Connector 6">
+            <a:extLst>
+              <a:ext uri="{FF2B5EF4-FFF2-40B4-BE49-F238E27FC236}">
+                <a16:creationId xmlns:a16="http://schemas.microsoft.com/office/drawing/2014/main" id="{EE169823-7EE0-4E97-9F46-FCE273CAF355}"/>
+              </a:ext>
+            </a:extLst>
+          </p:cNvPr>
+          <p:cNvCxnSpPr/>
+          <p:nvPr/>
+        </p:nvCxnSpPr>
+        <p:spPr>
+          <a:xfrm rot="5400000">
+            <a:off x="12250307" y="1529002"/>
+            <a:ext cx="0" cy="1313401"/>
+          </a:xfrm>
+          <a:prstGeom prst="line">
+            <a:avLst/>
+          </a:prstGeom>
+          <a:ln w="38100" cmpd="sng">
+            <a:solidFill>
+              <a:srgbClr val="4D4D4D"/>
+            </a:solidFill>
+          </a:ln>
+        </p:spPr>
+        <p:style>
+          <a:lnRef idx="2">
+            <a:schemeClr val="accent1"/>
+          </a:lnRef>
+          <a:fillRef idx="0">
+            <a:schemeClr val="accent1"/>
+          </a:fillRef>
+          <a:effectRef idx="1">
+            <a:schemeClr val="accent1"/>
+          </a:effectRef>
+          <a:fontRef idx="minor">
+            <a:schemeClr val="tx1"/>
+          </a:fontRef>
+        </p:style>
+      </p:cxnSp>
+    </p:spTree>
+    <p:extLst>
+      <p:ext uri="{BB962C8B-B14F-4D97-AF65-F5344CB8AC3E}">
+        <p14:creationId xmlns:p14="http://schemas.microsoft.com/office/powerpoint/2010/main" val="921920859"/>
+      </p:ext>
+    </p:extLst>
+  </p:cSld>
+  <p:clrMapOvr>
+    <a:masterClrMapping/>
+  </p:clrMapOvr>
+  <p:transition spd="slow">
+    <p:push dir="u"/>
+  </p:transition>
+</p:sld>
+</file>
+
+<file path=ppt/slides/slide13.xml><?xml version="1.0" encoding="utf-8"?>
+<p:sld xmlns:a="http://schemas.openxmlformats.org/drawingml/2006/main" xmlns:r="http://schemas.openxmlformats.org/officeDocument/2006/relationships" xmlns:p="http://schemas.openxmlformats.org/presentationml/2006/main">
+  <p:cSld>
+    <p:spTree>
+      <p:nvGrpSpPr>
+        <p:cNvPr id="1" name=""/>
+        <p:cNvGrpSpPr/>
+        <p:nvPr/>
+      </p:nvGrpSpPr>
+      <p:grpSpPr>
+        <a:xfrm>
+          <a:off x="0" y="0"/>
+          <a:ext cx="0" cy="0"/>
+          <a:chOff x="0" y="0"/>
+          <a:chExt cx="0" cy="0"/>
+        </a:xfrm>
+      </p:grpSpPr>
+      <p:sp>
+        <p:nvSpPr>
+          <p:cNvPr id="44" name="Line 5"/>
+          <p:cNvSpPr>
+            <a:spLocks noChangeShapeType="1"/>
+          </p:cNvSpPr>
+          <p:nvPr/>
+        </p:nvSpPr>
+        <p:spPr bwMode="auto">
+          <a:xfrm>
+            <a:off x="1493979" y="-1748368"/>
+            <a:ext cx="0" cy="0"/>
+          </a:xfrm>
+          <a:prstGeom prst="line">
+            <a:avLst/>
+          </a:prstGeom>
+          <a:noFill/>
+          <a:ln>
+            <a:noFill/>
+          </a:ln>
+          <a:extLst>
+            <a:ext uri="{909E8E84-426E-40dd-AFC4-6F175D3DCCD1}">
+              <a14:hiddenFill xmlns:a14="http://schemas.microsoft.com/office/drawing/2010/main" xmlns="">
+                <a:noFill/>
+              </a14:hiddenFill>
+            </a:ext>
+            <a:ext uri="{91240B29-F687-4f45-9708-019B960494DF}">
+              <a14:hiddenLine xmlns:a14="http://schemas.microsoft.com/office/drawing/2010/main" xmlns="" w="9525">
+                <a:solidFill>
+                  <a:srgbClr val="000000"/>
+                </a:solidFill>
+                <a:round/>
+                <a:headEnd/>
+                <a:tailEnd/>
+              </a14:hiddenLine>
+            </a:ext>
+          </a:extLst>
+        </p:spPr>
+        <p:txBody>
+          <a:bodyPr vert="horz" wrap="square" lIns="243797" tIns="121899" rIns="243797" bIns="121899" numCol="1" anchor="t" anchorCtr="0" compatLnSpc="1">
+            <a:prstTxWarp prst="textNoShape">
+              <a:avLst/>
+            </a:prstTxWarp>
+          </a:bodyPr>
+          <a:lstStyle/>
+          <a:p>
+            <a:endParaRPr lang="en-US">
+              <a:solidFill>
+                <a:srgbClr val="4D4D4D"/>
+              </a:solidFill>
+            </a:endParaRPr>
+          </a:p>
+        </p:txBody>
+      </p:sp>
+      <p:sp>
+        <p:nvSpPr>
+          <p:cNvPr id="45" name="Line 6"/>
+          <p:cNvSpPr>
+            <a:spLocks noChangeShapeType="1"/>
+          </p:cNvSpPr>
+          <p:nvPr/>
+        </p:nvSpPr>
+        <p:spPr bwMode="auto">
+          <a:xfrm>
+            <a:off x="1493979" y="-1748368"/>
+            <a:ext cx="0" cy="0"/>
+          </a:xfrm>
+          <a:prstGeom prst="line">
+            <a:avLst/>
+          </a:prstGeom>
+          <a:noFill/>
+          <a:ln>
+            <a:noFill/>
+          </a:ln>
+          <a:extLst>
+            <a:ext uri="{909E8E84-426E-40dd-AFC4-6F175D3DCCD1}">
+              <a14:hiddenFill xmlns:a14="http://schemas.microsoft.com/office/drawing/2010/main" xmlns="">
+                <a:noFill/>
+              </a14:hiddenFill>
+            </a:ext>
+            <a:ext uri="{91240B29-F687-4f45-9708-019B960494DF}">
+              <a14:hiddenLine xmlns:a14="http://schemas.microsoft.com/office/drawing/2010/main" xmlns="" w="9525">
+                <a:solidFill>
+                  <a:srgbClr val="000000"/>
+                </a:solidFill>
+                <a:round/>
+                <a:headEnd/>
+                <a:tailEnd/>
+              </a14:hiddenLine>
+            </a:ext>
+          </a:extLst>
+        </p:spPr>
+        <p:txBody>
+          <a:bodyPr vert="horz" wrap="square" lIns="243797" tIns="121899" rIns="243797" bIns="121899" numCol="1" anchor="t" anchorCtr="0" compatLnSpc="1">
+            <a:prstTxWarp prst="textNoShape">
+              <a:avLst/>
+            </a:prstTxWarp>
+          </a:bodyPr>
+          <a:lstStyle/>
+          <a:p>
+            <a:endParaRPr lang="en-US">
+              <a:solidFill>
+                <a:srgbClr val="4D4D4D"/>
+              </a:solidFill>
+            </a:endParaRPr>
+          </a:p>
+        </p:txBody>
+      </p:sp>
+      <p:sp>
+        <p:nvSpPr>
+          <p:cNvPr id="5" name="TextBox 4">
+            <a:extLst>
+              <a:ext uri="{FF2B5EF4-FFF2-40B4-BE49-F238E27FC236}">
+                <a16:creationId xmlns:a16="http://schemas.microsoft.com/office/drawing/2014/main" id="{6A66EF5C-C181-4F39-85B0-64A3AF06C2E3}"/>
+              </a:ext>
+            </a:extLst>
+          </p:cNvPr>
+          <p:cNvSpPr txBox="1"/>
+          <p:nvPr/>
+        </p:nvSpPr>
+        <p:spPr>
+          <a:xfrm>
             <a:off x="9312648" y="741286"/>
             <a:ext cx="5875326" cy="830997"/>
           </a:xfrm>
@@ -2923,7 +3820,7 @@
 </p:sld>
 </file>
 
-<file path=ppt/slides/slide13.xml><?xml version="1.0" encoding="utf-8"?>
+<file path=ppt/slides/slide14.xml><?xml version="1.0" encoding="utf-8"?>
 <p:sld xmlns:a="http://schemas.openxmlformats.org/drawingml/2006/main" xmlns:r="http://schemas.openxmlformats.org/officeDocument/2006/relationships" xmlns:p="http://schemas.openxmlformats.org/presentationml/2006/main">
   <p:cSld>
     <p:spTree>
@@ -4230,7 +5127,7 @@
 </p:sld>
 </file>
 
-<file path=ppt/slides/slide14.xml><?xml version="1.0" encoding="utf-8"?>
+<file path=ppt/slides/slide15.xml><?xml version="1.0" encoding="utf-8"?>
 <p:sld xmlns:a="http://schemas.openxmlformats.org/drawingml/2006/main" xmlns:r="http://schemas.openxmlformats.org/officeDocument/2006/relationships" xmlns:p="http://schemas.openxmlformats.org/presentationml/2006/main">
   <p:cSld>
     <p:spTree>
@@ -10336,6 +11233,236 @@
       </p:grpSpPr>
       <p:sp>
         <p:nvSpPr>
+          <p:cNvPr id="44" name="Line 5"/>
+          <p:cNvSpPr>
+            <a:spLocks noChangeShapeType="1"/>
+          </p:cNvSpPr>
+          <p:nvPr/>
+        </p:nvSpPr>
+        <p:spPr bwMode="auto">
+          <a:xfrm>
+            <a:off x="1493979" y="-1748368"/>
+            <a:ext cx="0" cy="0"/>
+          </a:xfrm>
+          <a:prstGeom prst="line">
+            <a:avLst/>
+          </a:prstGeom>
+          <a:noFill/>
+          <a:ln>
+            <a:noFill/>
+          </a:ln>
+          <a:extLst>
+            <a:ext uri="{909E8E84-426E-40dd-AFC4-6F175D3DCCD1}">
+              <a14:hiddenFill xmlns:a14="http://schemas.microsoft.com/office/drawing/2010/main" xmlns="">
+                <a:noFill/>
+              </a14:hiddenFill>
+            </a:ext>
+            <a:ext uri="{91240B29-F687-4f45-9708-019B960494DF}">
+              <a14:hiddenLine xmlns:a14="http://schemas.microsoft.com/office/drawing/2010/main" xmlns="" w="9525">
+                <a:solidFill>
+                  <a:srgbClr val="000000"/>
+                </a:solidFill>
+                <a:round/>
+                <a:headEnd/>
+                <a:tailEnd/>
+              </a14:hiddenLine>
+            </a:ext>
+          </a:extLst>
+        </p:spPr>
+        <p:txBody>
+          <a:bodyPr vert="horz" wrap="square" lIns="243797" tIns="121899" rIns="243797" bIns="121899" numCol="1" anchor="t" anchorCtr="0" compatLnSpc="1">
+            <a:prstTxWarp prst="textNoShape">
+              <a:avLst/>
+            </a:prstTxWarp>
+          </a:bodyPr>
+          <a:lstStyle/>
+          <a:p>
+            <a:endParaRPr lang="en-US">
+              <a:solidFill>
+                <a:srgbClr val="4D4D4D"/>
+              </a:solidFill>
+            </a:endParaRPr>
+          </a:p>
+        </p:txBody>
+      </p:sp>
+      <p:sp>
+        <p:nvSpPr>
+          <p:cNvPr id="45" name="Line 6"/>
+          <p:cNvSpPr>
+            <a:spLocks noChangeShapeType="1"/>
+          </p:cNvSpPr>
+          <p:nvPr/>
+        </p:nvSpPr>
+        <p:spPr bwMode="auto">
+          <a:xfrm>
+            <a:off x="1493979" y="-1748368"/>
+            <a:ext cx="0" cy="0"/>
+          </a:xfrm>
+          <a:prstGeom prst="line">
+            <a:avLst/>
+          </a:prstGeom>
+          <a:noFill/>
+          <a:ln>
+            <a:noFill/>
+          </a:ln>
+          <a:extLst>
+            <a:ext uri="{909E8E84-426E-40dd-AFC4-6F175D3DCCD1}">
+              <a14:hiddenFill xmlns:a14="http://schemas.microsoft.com/office/drawing/2010/main" xmlns="">
+                <a:noFill/>
+              </a14:hiddenFill>
+            </a:ext>
+            <a:ext uri="{91240B29-F687-4f45-9708-019B960494DF}">
+              <a14:hiddenLine xmlns:a14="http://schemas.microsoft.com/office/drawing/2010/main" xmlns="" w="9525">
+                <a:solidFill>
+                  <a:srgbClr val="000000"/>
+                </a:solidFill>
+                <a:round/>
+                <a:headEnd/>
+                <a:tailEnd/>
+              </a14:hiddenLine>
+            </a:ext>
+          </a:extLst>
+        </p:spPr>
+        <p:txBody>
+          <a:bodyPr vert="horz" wrap="square" lIns="243797" tIns="121899" rIns="243797" bIns="121899" numCol="1" anchor="t" anchorCtr="0" compatLnSpc="1">
+            <a:prstTxWarp prst="textNoShape">
+              <a:avLst/>
+            </a:prstTxWarp>
+          </a:bodyPr>
+          <a:lstStyle/>
+          <a:p>
+            <a:endParaRPr lang="en-US">
+              <a:solidFill>
+                <a:srgbClr val="4D4D4D"/>
+              </a:solidFill>
+            </a:endParaRPr>
+          </a:p>
+        </p:txBody>
+      </p:sp>
+      <p:sp>
+        <p:nvSpPr>
+          <p:cNvPr id="5" name="TextBox 4">
+            <a:extLst>
+              <a:ext uri="{FF2B5EF4-FFF2-40B4-BE49-F238E27FC236}">
+                <a16:creationId xmlns:a16="http://schemas.microsoft.com/office/drawing/2014/main" id="{6A66EF5C-C181-4F39-85B0-64A3AF06C2E3}"/>
+              </a:ext>
+            </a:extLst>
+          </p:cNvPr>
+          <p:cNvSpPr txBox="1"/>
+          <p:nvPr/>
+        </p:nvSpPr>
+        <p:spPr>
+          <a:xfrm>
+            <a:off x="8977623" y="741286"/>
+            <a:ext cx="6545383" cy="830997"/>
+          </a:xfrm>
+          <a:prstGeom prst="rect">
+            <a:avLst/>
+          </a:prstGeom>
+          <a:noFill/>
+        </p:spPr>
+        <p:txBody>
+          <a:bodyPr wrap="none" rtlCol="0">
+            <a:spAutoFit/>
+          </a:bodyPr>
+          <a:lstStyle/>
+          <a:p>
+            <a:pPr algn="ctr"/>
+            <a:r>
+              <a:rPr lang="en-US" sz="4800" dirty="0">
+                <a:solidFill>
+                  <a:srgbClr val="4D4D4D"/>
+                </a:solidFill>
+                <a:cs typeface="Lato Light"/>
+              </a:rPr>
+              <a:t>Printers - Service Status</a:t>
+            </a:r>
+            <a:endParaRPr lang="en-US" sz="4800" dirty="0">
+              <a:solidFill>
+                <a:srgbClr val="4D4D4D"/>
+              </a:solidFill>
+              <a:latin typeface="Lato Light"/>
+              <a:cs typeface="Lato Light"/>
+            </a:endParaRPr>
+          </a:p>
+        </p:txBody>
+      </p:sp>
+      <p:cxnSp>
+        <p:nvCxnSpPr>
+          <p:cNvPr id="7" name="Straight Connector 6">
+            <a:extLst>
+              <a:ext uri="{FF2B5EF4-FFF2-40B4-BE49-F238E27FC236}">
+                <a16:creationId xmlns:a16="http://schemas.microsoft.com/office/drawing/2014/main" id="{EE169823-7EE0-4E97-9F46-FCE273CAF355}"/>
+              </a:ext>
+            </a:extLst>
+          </p:cNvPr>
+          <p:cNvCxnSpPr/>
+          <p:nvPr/>
+        </p:nvCxnSpPr>
+        <p:spPr>
+          <a:xfrm rot="5400000">
+            <a:off x="12250307" y="1529002"/>
+            <a:ext cx="0" cy="1313401"/>
+          </a:xfrm>
+          <a:prstGeom prst="line">
+            <a:avLst/>
+          </a:prstGeom>
+          <a:ln w="38100" cmpd="sng">
+            <a:solidFill>
+              <a:srgbClr val="4D4D4D"/>
+            </a:solidFill>
+          </a:ln>
+        </p:spPr>
+        <p:style>
+          <a:lnRef idx="2">
+            <a:schemeClr val="accent1"/>
+          </a:lnRef>
+          <a:fillRef idx="0">
+            <a:schemeClr val="accent1"/>
+          </a:fillRef>
+          <a:effectRef idx="1">
+            <a:schemeClr val="accent1"/>
+          </a:effectRef>
+          <a:fontRef idx="minor">
+            <a:schemeClr val="tx1"/>
+          </a:fontRef>
+        </p:style>
+      </p:cxnSp>
+    </p:spTree>
+    <p:extLst>
+      <p:ext uri="{BB962C8B-B14F-4D97-AF65-F5344CB8AC3E}">
+        <p14:creationId xmlns:p14="http://schemas.microsoft.com/office/powerpoint/2010/main" val="3443894100"/>
+      </p:ext>
+    </p:extLst>
+  </p:cSld>
+  <p:clrMapOvr>
+    <a:masterClrMapping/>
+  </p:clrMapOvr>
+  <p:transition spd="slow">
+    <p:push dir="u"/>
+  </p:transition>
+</p:sld>
+</file>
+
+<file path=ppt/slides/slide8.xml><?xml version="1.0" encoding="utf-8"?>
+<p:sld xmlns:a="http://schemas.openxmlformats.org/drawingml/2006/main" xmlns:r="http://schemas.openxmlformats.org/officeDocument/2006/relationships" xmlns:p="http://schemas.openxmlformats.org/presentationml/2006/main">
+  <p:cSld>
+    <p:spTree>
+      <p:nvGrpSpPr>
+        <p:cNvPr id="1" name=""/>
+        <p:cNvGrpSpPr/>
+        <p:nvPr/>
+      </p:nvGrpSpPr>
+      <p:grpSpPr>
+        <a:xfrm>
+          <a:off x="0" y="0"/>
+          <a:ext cx="0" cy="0"/>
+          <a:chOff x="0" y="0"/>
+          <a:chExt cx="0" cy="0"/>
+        </a:xfrm>
+      </p:grpSpPr>
+      <p:sp>
+        <p:nvSpPr>
           <p:cNvPr id="5" name="TextBox 4">
             <a:extLst>
               <a:ext uri="{FF2B5EF4-FFF2-40B4-BE49-F238E27FC236}">
@@ -11264,7 +12391,7 @@
 </p:sld>
 </file>
 
-<file path=ppt/slides/slide8.xml><?xml version="1.0" encoding="utf-8"?>
+<file path=ppt/slides/slide9.xml><?xml version="1.0" encoding="utf-8"?>
 <p:sld xmlns:a="http://schemas.openxmlformats.org/drawingml/2006/main" xmlns:r="http://schemas.openxmlformats.org/officeDocument/2006/relationships" xmlns:p="http://schemas.openxmlformats.org/presentationml/2006/main">
   <p:cSld>
     <p:spTree>
@@ -12555,897 +13682,6 @@
     <p:extLst>
       <p:ext uri="{BB962C8B-B14F-4D97-AF65-F5344CB8AC3E}">
         <p14:creationId xmlns:p14="http://schemas.microsoft.com/office/powerpoint/2010/main" val="146374151"/>
-      </p:ext>
-    </p:extLst>
-  </p:cSld>
-  <p:clrMapOvr>
-    <a:masterClrMapping/>
-  </p:clrMapOvr>
-  <p:transition spd="slow">
-    <p:push dir="u"/>
-  </p:transition>
-</p:sld>
-</file>
-
-<file path=ppt/slides/slide9.xml><?xml version="1.0" encoding="utf-8"?>
-<p:sld xmlns:a="http://schemas.openxmlformats.org/drawingml/2006/main" xmlns:r="http://schemas.openxmlformats.org/officeDocument/2006/relationships" xmlns:p="http://schemas.openxmlformats.org/presentationml/2006/main">
-  <p:cSld>
-    <p:spTree>
-      <p:nvGrpSpPr>
-        <p:cNvPr id="1" name=""/>
-        <p:cNvGrpSpPr/>
-        <p:nvPr/>
-      </p:nvGrpSpPr>
-      <p:grpSpPr>
-        <a:xfrm>
-          <a:off x="0" y="0"/>
-          <a:ext cx="0" cy="0"/>
-          <a:chOff x="0" y="0"/>
-          <a:chExt cx="0" cy="0"/>
-        </a:xfrm>
-      </p:grpSpPr>
-      <p:sp>
-        <p:nvSpPr>
-          <p:cNvPr id="44" name="Line 5"/>
-          <p:cNvSpPr>
-            <a:spLocks noChangeShapeType="1"/>
-          </p:cNvSpPr>
-          <p:nvPr/>
-        </p:nvSpPr>
-        <p:spPr bwMode="auto">
-          <a:xfrm>
-            <a:off x="1493979" y="-1748368"/>
-            <a:ext cx="0" cy="0"/>
-          </a:xfrm>
-          <a:prstGeom prst="line">
-            <a:avLst/>
-          </a:prstGeom>
-          <a:noFill/>
-          <a:ln>
-            <a:noFill/>
-          </a:ln>
-          <a:extLst>
-            <a:ext uri="{909E8E84-426E-40dd-AFC4-6F175D3DCCD1}">
-              <a14:hiddenFill xmlns:a14="http://schemas.microsoft.com/office/drawing/2010/main" xmlns="">
-                <a:noFill/>
-              </a14:hiddenFill>
-            </a:ext>
-            <a:ext uri="{91240B29-F687-4f45-9708-019B960494DF}">
-              <a14:hiddenLine xmlns:a14="http://schemas.microsoft.com/office/drawing/2010/main" xmlns="" w="9525">
-                <a:solidFill>
-                  <a:srgbClr val="000000"/>
-                </a:solidFill>
-                <a:round/>
-                <a:headEnd/>
-                <a:tailEnd/>
-              </a14:hiddenLine>
-            </a:ext>
-          </a:extLst>
-        </p:spPr>
-        <p:txBody>
-          <a:bodyPr vert="horz" wrap="square" lIns="243797" tIns="121899" rIns="243797" bIns="121899" numCol="1" anchor="t" anchorCtr="0" compatLnSpc="1">
-            <a:prstTxWarp prst="textNoShape">
-              <a:avLst/>
-            </a:prstTxWarp>
-          </a:bodyPr>
-          <a:lstStyle/>
-          <a:p>
-            <a:endParaRPr lang="en-US">
-              <a:solidFill>
-                <a:srgbClr val="4D4D4D"/>
-              </a:solidFill>
-            </a:endParaRPr>
-          </a:p>
-        </p:txBody>
-      </p:sp>
-      <p:sp>
-        <p:nvSpPr>
-          <p:cNvPr id="45" name="Line 6"/>
-          <p:cNvSpPr>
-            <a:spLocks noChangeShapeType="1"/>
-          </p:cNvSpPr>
-          <p:nvPr/>
-        </p:nvSpPr>
-        <p:spPr bwMode="auto">
-          <a:xfrm>
-            <a:off x="1493979" y="-1748368"/>
-            <a:ext cx="0" cy="0"/>
-          </a:xfrm>
-          <a:prstGeom prst="line">
-            <a:avLst/>
-          </a:prstGeom>
-          <a:noFill/>
-          <a:ln>
-            <a:noFill/>
-          </a:ln>
-          <a:extLst>
-            <a:ext uri="{909E8E84-426E-40dd-AFC4-6F175D3DCCD1}">
-              <a14:hiddenFill xmlns:a14="http://schemas.microsoft.com/office/drawing/2010/main" xmlns="">
-                <a:noFill/>
-              </a14:hiddenFill>
-            </a:ext>
-            <a:ext uri="{91240B29-F687-4f45-9708-019B960494DF}">
-              <a14:hiddenLine xmlns:a14="http://schemas.microsoft.com/office/drawing/2010/main" xmlns="" w="9525">
-                <a:solidFill>
-                  <a:srgbClr val="000000"/>
-                </a:solidFill>
-                <a:round/>
-                <a:headEnd/>
-                <a:tailEnd/>
-              </a14:hiddenLine>
-            </a:ext>
-          </a:extLst>
-        </p:spPr>
-        <p:txBody>
-          <a:bodyPr vert="horz" wrap="square" lIns="243797" tIns="121899" rIns="243797" bIns="121899" numCol="1" anchor="t" anchorCtr="0" compatLnSpc="1">
-            <a:prstTxWarp prst="textNoShape">
-              <a:avLst/>
-            </a:prstTxWarp>
-          </a:bodyPr>
-          <a:lstStyle/>
-          <a:p>
-            <a:endParaRPr lang="en-US">
-              <a:solidFill>
-                <a:srgbClr val="4D4D4D"/>
-              </a:solidFill>
-            </a:endParaRPr>
-          </a:p>
-        </p:txBody>
-      </p:sp>
-      <p:sp>
-        <p:nvSpPr>
-          <p:cNvPr id="5" name="TextBox 4">
-            <a:extLst>
-              <a:ext uri="{FF2B5EF4-FFF2-40B4-BE49-F238E27FC236}">
-                <a16:creationId xmlns:a16="http://schemas.microsoft.com/office/drawing/2014/main" id="{6A66EF5C-C181-4F39-85B0-64A3AF06C2E3}"/>
-              </a:ext>
-            </a:extLst>
-          </p:cNvPr>
-          <p:cNvSpPr txBox="1"/>
-          <p:nvPr/>
-        </p:nvSpPr>
-        <p:spPr>
-          <a:xfrm>
-            <a:off x="9591571" y="738196"/>
-            <a:ext cx="5317481" cy="830997"/>
-          </a:xfrm>
-          <a:prstGeom prst="rect">
-            <a:avLst/>
-          </a:prstGeom>
-          <a:noFill/>
-        </p:spPr>
-        <p:txBody>
-          <a:bodyPr wrap="none" rtlCol="0">
-            <a:spAutoFit/>
-          </a:bodyPr>
-          <a:lstStyle/>
-          <a:p>
-            <a:pPr algn="ctr"/>
-            <a:r>
-              <a:rPr lang="en-US" sz="4800" dirty="0">
-                <a:solidFill>
-                  <a:srgbClr val="4D4D4D"/>
-                </a:solidFill>
-                <a:cs typeface="Lato Light"/>
-              </a:rPr>
-              <a:t>User – Print Details</a:t>
-            </a:r>
-          </a:p>
-        </p:txBody>
-      </p:sp>
-      <p:sp>
-        <p:nvSpPr>
-          <p:cNvPr id="27" name="TextBox 26">
-            <a:extLst>
-              <a:ext uri="{FF2B5EF4-FFF2-40B4-BE49-F238E27FC236}">
-                <a16:creationId xmlns:a16="http://schemas.microsoft.com/office/drawing/2014/main" id="{3A3344D4-F57B-4C8C-89C2-E4521BF1CAB3}"/>
-              </a:ext>
-            </a:extLst>
-          </p:cNvPr>
-          <p:cNvSpPr txBox="1"/>
-          <p:nvPr/>
-        </p:nvSpPr>
-        <p:spPr>
-          <a:xfrm>
-            <a:off x="347988" y="2326644"/>
-            <a:ext cx="2989165" cy="517028"/>
-          </a:xfrm>
-          <a:prstGeom prst="rect">
-            <a:avLst/>
-          </a:prstGeom>
-          <a:noFill/>
-        </p:spPr>
-        <p:txBody>
-          <a:bodyPr wrap="square" lIns="243791" tIns="91422" rIns="243791" bIns="91422" rtlCol="0">
-            <a:spAutoFit/>
-          </a:bodyPr>
-          <a:lstStyle/>
-          <a:p>
-            <a:pPr algn="ctr">
-              <a:lnSpc>
-                <a:spcPct val="90000"/>
-              </a:lnSpc>
-              <a:spcBef>
-                <a:spcPts val="2134"/>
-              </a:spcBef>
-            </a:pPr>
-            <a:r>
-              <a:rPr lang="en-US" sz="2400" dirty="0">
-                <a:solidFill>
-                  <a:srgbClr val="4D4D4D"/>
-                </a:solidFill>
-                <a:cs typeface="Lato Light"/>
-              </a:rPr>
-              <a:t>Printed 2-sided</a:t>
-            </a:r>
-            <a:endParaRPr lang="en-US" sz="2400" dirty="0">
-              <a:solidFill>
-                <a:srgbClr val="4D4D4D"/>
-              </a:solidFill>
-              <a:latin typeface="Lato Light"/>
-            </a:endParaRPr>
-          </a:p>
-        </p:txBody>
-      </p:sp>
-      <p:sp>
-        <p:nvSpPr>
-          <p:cNvPr id="114" name="TextBox 113">
-            <a:extLst>
-              <a:ext uri="{FF2B5EF4-FFF2-40B4-BE49-F238E27FC236}">
-                <a16:creationId xmlns:a16="http://schemas.microsoft.com/office/drawing/2014/main" id="{2A327888-FDAE-4BFF-9470-5E94C5B0315E}"/>
-              </a:ext>
-            </a:extLst>
-          </p:cNvPr>
-          <p:cNvSpPr txBox="1"/>
-          <p:nvPr/>
-        </p:nvSpPr>
-        <p:spPr>
-          <a:xfrm>
-            <a:off x="14292795" y="8394066"/>
-            <a:ext cx="2989165" cy="517028"/>
-          </a:xfrm>
-          <a:prstGeom prst="rect">
-            <a:avLst/>
-          </a:prstGeom>
-          <a:noFill/>
-        </p:spPr>
-        <p:txBody>
-          <a:bodyPr wrap="square" lIns="243791" tIns="91422" rIns="243791" bIns="91422" rtlCol="0">
-            <a:spAutoFit/>
-          </a:bodyPr>
-          <a:lstStyle/>
-          <a:p>
-            <a:pPr algn="r">
-              <a:lnSpc>
-                <a:spcPct val="90000"/>
-              </a:lnSpc>
-              <a:spcBef>
-                <a:spcPts val="2134"/>
-              </a:spcBef>
-            </a:pPr>
-            <a:r>
-              <a:rPr lang="en-US" sz="2400">
-                <a:solidFill>
-                  <a:srgbClr val="4D4D4D"/>
-                </a:solidFill>
-                <a:cs typeface="Lato Light"/>
-              </a:rPr>
-              <a:t>Workstations</a:t>
-            </a:r>
-            <a:endParaRPr lang="en-US" sz="2400" dirty="0">
-              <a:solidFill>
-                <a:srgbClr val="4D4D4D"/>
-              </a:solidFill>
-              <a:cs typeface="Lato Light"/>
-            </a:endParaRPr>
-          </a:p>
-        </p:txBody>
-      </p:sp>
-      <p:sp>
-        <p:nvSpPr>
-          <p:cNvPr id="24" name="TextBox 23">
-            <a:extLst>
-              <a:ext uri="{FF2B5EF4-FFF2-40B4-BE49-F238E27FC236}">
-                <a16:creationId xmlns:a16="http://schemas.microsoft.com/office/drawing/2014/main" id="{8A36327E-1820-43E3-9996-1C119EB929D2}"/>
-              </a:ext>
-            </a:extLst>
-          </p:cNvPr>
-          <p:cNvSpPr txBox="1"/>
-          <p:nvPr/>
-        </p:nvSpPr>
-        <p:spPr>
-          <a:xfrm>
-            <a:off x="11423883" y="1553507"/>
-            <a:ext cx="1529883" cy="517028"/>
-          </a:xfrm>
-          <a:prstGeom prst="rect">
-            <a:avLst/>
-          </a:prstGeom>
-          <a:noFill/>
-        </p:spPr>
-        <p:txBody>
-          <a:bodyPr wrap="square" lIns="243791" tIns="91422" rIns="243791" bIns="91422" rtlCol="0">
-            <a:spAutoFit/>
-          </a:bodyPr>
-          <a:lstStyle/>
-          <a:p>
-            <a:pPr algn="r">
-              <a:lnSpc>
-                <a:spcPct val="90000"/>
-              </a:lnSpc>
-              <a:spcBef>
-                <a:spcPts val="2134"/>
-              </a:spcBef>
-            </a:pPr>
-            <a:r>
-              <a:rPr lang="en-US" sz="2400" dirty="0">
-                <a:solidFill>
-                  <a:srgbClr val="4D4D4D"/>
-                </a:solidFill>
-                <a:latin typeface="Lato Light"/>
-                <a:cs typeface="Lato Light"/>
-              </a:rPr>
-              <a:t>Per day</a:t>
-            </a:r>
-          </a:p>
-        </p:txBody>
-      </p:sp>
-      <p:sp>
-        <p:nvSpPr>
-          <p:cNvPr id="20" name="TextBox 19">
-            <a:extLst>
-              <a:ext uri="{FF2B5EF4-FFF2-40B4-BE49-F238E27FC236}">
-                <a16:creationId xmlns:a16="http://schemas.microsoft.com/office/drawing/2014/main" id="{AE403E1A-98EF-4F68-9851-97F19A0770E3}"/>
-              </a:ext>
-            </a:extLst>
-          </p:cNvPr>
-          <p:cNvSpPr txBox="1"/>
-          <p:nvPr/>
-        </p:nvSpPr>
-        <p:spPr>
-          <a:xfrm>
-            <a:off x="8079318" y="2326644"/>
-            <a:ext cx="2016013" cy="517028"/>
-          </a:xfrm>
-          <a:prstGeom prst="rect">
-            <a:avLst/>
-          </a:prstGeom>
-          <a:noFill/>
-        </p:spPr>
-        <p:txBody>
-          <a:bodyPr wrap="square" lIns="243791" tIns="91422" rIns="243791" bIns="91422" rtlCol="0">
-            <a:spAutoFit/>
-          </a:bodyPr>
-          <a:lstStyle/>
-          <a:p>
-            <a:pPr algn="ctr">
-              <a:lnSpc>
-                <a:spcPct val="90000"/>
-              </a:lnSpc>
-              <a:spcBef>
-                <a:spcPts val="2134"/>
-              </a:spcBef>
-            </a:pPr>
-            <a:r>
-              <a:rPr lang="en-US" sz="2400" dirty="0">
-                <a:solidFill>
-                  <a:srgbClr val="4D4D4D"/>
-                </a:solidFill>
-                <a:latin typeface="Lato Light"/>
-                <a:cs typeface="Lato Light"/>
-              </a:rPr>
-              <a:t>Paper Size</a:t>
-            </a:r>
-          </a:p>
-        </p:txBody>
-      </p:sp>
-      <p:sp>
-        <p:nvSpPr>
-          <p:cNvPr id="25" name="TextBox 24">
-            <a:extLst>
-              <a:ext uri="{FF2B5EF4-FFF2-40B4-BE49-F238E27FC236}">
-                <a16:creationId xmlns:a16="http://schemas.microsoft.com/office/drawing/2014/main" id="{B2A3DF0A-4D35-4B9A-8618-665328380448}"/>
-              </a:ext>
-            </a:extLst>
-          </p:cNvPr>
-          <p:cNvSpPr txBox="1"/>
-          <p:nvPr/>
-        </p:nvSpPr>
-        <p:spPr>
-          <a:xfrm>
-            <a:off x="-488624" y="8394066"/>
-            <a:ext cx="2989165" cy="517028"/>
-          </a:xfrm>
-          <a:prstGeom prst="rect">
-            <a:avLst/>
-          </a:prstGeom>
-          <a:noFill/>
-        </p:spPr>
-        <p:txBody>
-          <a:bodyPr wrap="square" lIns="243791" tIns="91422" rIns="243791" bIns="91422" rtlCol="0">
-            <a:spAutoFit/>
-          </a:bodyPr>
-          <a:lstStyle/>
-          <a:p>
-            <a:pPr algn="r">
-              <a:lnSpc>
-                <a:spcPct val="90000"/>
-              </a:lnSpc>
-              <a:spcBef>
-                <a:spcPts val="2134"/>
-              </a:spcBef>
-            </a:pPr>
-            <a:r>
-              <a:rPr lang="en-US" sz="2400" dirty="0">
-                <a:solidFill>
-                  <a:srgbClr val="4D4D4D"/>
-                </a:solidFill>
-                <a:latin typeface="Lato Light"/>
-                <a:cs typeface="Lato Light"/>
-              </a:rPr>
-              <a:t>Total Sheets</a:t>
-            </a:r>
-          </a:p>
-        </p:txBody>
-      </p:sp>
-      <p:sp>
-        <p:nvSpPr>
-          <p:cNvPr id="23" name="Text Placeholder 2">
-            <a:extLst>
-              <a:ext uri="{FF2B5EF4-FFF2-40B4-BE49-F238E27FC236}">
-                <a16:creationId xmlns:a16="http://schemas.microsoft.com/office/drawing/2014/main" id="{99ABAAAA-8C7C-4A1A-9C77-7FF06C773C7E}"/>
-              </a:ext>
-            </a:extLst>
-          </p:cNvPr>
-          <p:cNvSpPr txBox="1">
-            <a:spLocks/>
-          </p:cNvSpPr>
-          <p:nvPr/>
-        </p:nvSpPr>
-        <p:spPr>
-          <a:xfrm>
-            <a:off x="10133545" y="5115180"/>
-            <a:ext cx="4159250" cy="4159250"/>
-          </a:xfrm>
-          <a:prstGeom prst="rect">
-            <a:avLst/>
-          </a:prstGeom>
-        </p:spPr>
-        <p:txBody>
-          <a:bodyPr anchor="ctr" anchorCtr="1"/>
-          <a:lstStyle>
-            <a:lvl1pPr marL="0" indent="0" algn="l" defTabSz="1828434" rtl="0" eaLnBrk="1" latinLnBrk="0" hangingPunct="1">
-              <a:lnSpc>
-                <a:spcPct val="90000"/>
-              </a:lnSpc>
-              <a:spcBef>
-                <a:spcPts val="2000"/>
-              </a:spcBef>
-              <a:buFont typeface="Arial" panose="020B0604020202020204" pitchFamily="34" charset="0"/>
-              <a:buNone/>
-              <a:defRPr lang="en-US" sz="4800" kern="1200" dirty="0" smtClean="0">
-                <a:solidFill>
-                  <a:schemeClr val="tx1"/>
-                </a:solidFill>
-                <a:effectLst/>
-                <a:latin typeface="Lato Light"/>
-                <a:ea typeface="+mn-ea"/>
-                <a:cs typeface="Lato Light"/>
-              </a:defRPr>
-            </a:lvl1pPr>
-            <a:lvl2pPr marL="914217" indent="0" algn="l" defTabSz="1828434" rtl="0" eaLnBrk="1" latinLnBrk="0" hangingPunct="1">
-              <a:lnSpc>
-                <a:spcPct val="90000"/>
-              </a:lnSpc>
-              <a:spcBef>
-                <a:spcPts val="1000"/>
-              </a:spcBef>
-              <a:buFont typeface="Arial" panose="020B0604020202020204" pitchFamily="34" charset="0"/>
-              <a:buNone/>
-              <a:defRPr lang="en-US" sz="4000" kern="1200" dirty="0" smtClean="0">
-                <a:solidFill>
-                  <a:schemeClr val="tx1"/>
-                </a:solidFill>
-                <a:effectLst/>
-                <a:latin typeface="Lato Light"/>
-                <a:ea typeface="+mn-ea"/>
-                <a:cs typeface="Lato Light"/>
-              </a:defRPr>
-            </a:lvl2pPr>
-            <a:lvl3pPr marL="1828434" indent="0" algn="l" defTabSz="1828434" rtl="0" eaLnBrk="1" latinLnBrk="0" hangingPunct="1">
-              <a:lnSpc>
-                <a:spcPct val="90000"/>
-              </a:lnSpc>
-              <a:spcBef>
-                <a:spcPts val="1000"/>
-              </a:spcBef>
-              <a:buFont typeface="Arial" panose="020B0604020202020204" pitchFamily="34" charset="0"/>
-              <a:buNone/>
-              <a:defRPr lang="en-US" sz="3600" kern="1200" dirty="0" smtClean="0">
-                <a:solidFill>
-                  <a:schemeClr val="tx1"/>
-                </a:solidFill>
-                <a:effectLst/>
-                <a:latin typeface="Lato Light"/>
-                <a:ea typeface="+mn-ea"/>
-                <a:cs typeface="Lato Light"/>
-              </a:defRPr>
-            </a:lvl3pPr>
-            <a:lvl4pPr marL="2742651" indent="0" algn="l" defTabSz="1828434" rtl="0" eaLnBrk="1" latinLnBrk="0" hangingPunct="1">
-              <a:lnSpc>
-                <a:spcPct val="90000"/>
-              </a:lnSpc>
-              <a:spcBef>
-                <a:spcPts val="1000"/>
-              </a:spcBef>
-              <a:buFont typeface="Arial" panose="020B0604020202020204" pitchFamily="34" charset="0"/>
-              <a:buNone/>
-              <a:defRPr lang="en-US" sz="3200" kern="1200" dirty="0" smtClean="0">
-                <a:solidFill>
-                  <a:schemeClr val="tx1"/>
-                </a:solidFill>
-                <a:effectLst/>
-                <a:latin typeface="Lato Light"/>
-                <a:ea typeface="+mn-ea"/>
-                <a:cs typeface="Lato Light"/>
-              </a:defRPr>
-            </a:lvl4pPr>
-            <a:lvl5pPr marL="3656868" indent="0" algn="l" defTabSz="1828434" rtl="0" eaLnBrk="1" latinLnBrk="0" hangingPunct="1">
-              <a:lnSpc>
-                <a:spcPct val="90000"/>
-              </a:lnSpc>
-              <a:spcBef>
-                <a:spcPts val="1000"/>
-              </a:spcBef>
-              <a:buFont typeface="Arial" panose="020B0604020202020204" pitchFamily="34" charset="0"/>
-              <a:buNone/>
-              <a:defRPr lang="en-US" sz="3200" kern="1200" dirty="0">
-                <a:solidFill>
-                  <a:schemeClr val="tx1"/>
-                </a:solidFill>
-                <a:effectLst/>
-                <a:latin typeface="Lato Light"/>
-                <a:ea typeface="+mn-ea"/>
-                <a:cs typeface="Lato Light"/>
-              </a:defRPr>
-            </a:lvl5pPr>
-            <a:lvl6pPr marL="5028194" indent="-457109" algn="l" defTabSz="1828434" rtl="0" eaLnBrk="1" latinLnBrk="0" hangingPunct="1">
-              <a:lnSpc>
-                <a:spcPct val="90000"/>
-              </a:lnSpc>
-              <a:spcBef>
-                <a:spcPts val="1000"/>
-              </a:spcBef>
-              <a:buFont typeface="Arial" panose="020B0604020202020204" pitchFamily="34" charset="0"/>
-              <a:buChar char="•"/>
-              <a:defRPr sz="3600" kern="1200">
-                <a:solidFill>
-                  <a:schemeClr val="tx1"/>
-                </a:solidFill>
-                <a:latin typeface="+mn-lt"/>
-                <a:ea typeface="+mn-ea"/>
-                <a:cs typeface="+mn-cs"/>
-              </a:defRPr>
-            </a:lvl6pPr>
-            <a:lvl7pPr marL="5942411" indent="-457109" algn="l" defTabSz="1828434" rtl="0" eaLnBrk="1" latinLnBrk="0" hangingPunct="1">
-              <a:lnSpc>
-                <a:spcPct val="90000"/>
-              </a:lnSpc>
-              <a:spcBef>
-                <a:spcPts val="1000"/>
-              </a:spcBef>
-              <a:buFont typeface="Arial" panose="020B0604020202020204" pitchFamily="34" charset="0"/>
-              <a:buChar char="•"/>
-              <a:defRPr sz="3600" kern="1200">
-                <a:solidFill>
-                  <a:schemeClr val="tx1"/>
-                </a:solidFill>
-                <a:latin typeface="+mn-lt"/>
-                <a:ea typeface="+mn-ea"/>
-                <a:cs typeface="+mn-cs"/>
-              </a:defRPr>
-            </a:lvl7pPr>
-            <a:lvl8pPr marL="6856628" indent="-457109" algn="l" defTabSz="1828434" rtl="0" eaLnBrk="1" latinLnBrk="0" hangingPunct="1">
-              <a:lnSpc>
-                <a:spcPct val="90000"/>
-              </a:lnSpc>
-              <a:spcBef>
-                <a:spcPts val="1000"/>
-              </a:spcBef>
-              <a:buFont typeface="Arial" panose="020B0604020202020204" pitchFamily="34" charset="0"/>
-              <a:buChar char="•"/>
-              <a:defRPr sz="3600" kern="1200">
-                <a:solidFill>
-                  <a:schemeClr val="tx1"/>
-                </a:solidFill>
-                <a:latin typeface="+mn-lt"/>
-                <a:ea typeface="+mn-ea"/>
-                <a:cs typeface="+mn-cs"/>
-              </a:defRPr>
-            </a:lvl8pPr>
-            <a:lvl9pPr marL="7770846" indent="-457109" algn="l" defTabSz="1828434" rtl="0" eaLnBrk="1" latinLnBrk="0" hangingPunct="1">
-              <a:lnSpc>
-                <a:spcPct val="90000"/>
-              </a:lnSpc>
-              <a:spcBef>
-                <a:spcPts val="1000"/>
-              </a:spcBef>
-              <a:buFont typeface="Arial" panose="020B0604020202020204" pitchFamily="34" charset="0"/>
-              <a:buChar char="•"/>
-              <a:defRPr sz="3600" kern="1200">
-                <a:solidFill>
-                  <a:schemeClr val="tx1"/>
-                </a:solidFill>
-                <a:latin typeface="+mn-lt"/>
-                <a:ea typeface="+mn-ea"/>
-                <a:cs typeface="+mn-cs"/>
-              </a:defRPr>
-            </a:lvl9pPr>
-          </a:lstStyle>
-          <a:p>
-            <a:r>
-              <a:rPr lang="nb-NO" sz="19900" dirty="0">
-                <a:solidFill>
-                  <a:srgbClr val="4D4D4D"/>
-                </a:solidFill>
-                <a:latin typeface="icons" panose="02000509000000000000" pitchFamily="49" charset="0"/>
-              </a:rPr>
-              <a:t>6</a:t>
-            </a:r>
-            <a:endParaRPr lang="nb-NO" sz="71400" dirty="0">
-              <a:solidFill>
-                <a:srgbClr val="4D4D4D"/>
-              </a:solidFill>
-            </a:endParaRPr>
-          </a:p>
-        </p:txBody>
-      </p:sp>
-      <p:cxnSp>
-        <p:nvCxnSpPr>
-          <p:cNvPr id="26" name="Straight Connector 25">
-            <a:extLst>
-              <a:ext uri="{FF2B5EF4-FFF2-40B4-BE49-F238E27FC236}">
-                <a16:creationId xmlns:a16="http://schemas.microsoft.com/office/drawing/2014/main" id="{7BFEC2E0-0EB6-4BF0-A7AC-89811187E19A}"/>
-              </a:ext>
-            </a:extLst>
-          </p:cNvPr>
-          <p:cNvCxnSpPr/>
-          <p:nvPr/>
-        </p:nvCxnSpPr>
-        <p:spPr>
-          <a:xfrm rot="5400000">
-            <a:off x="12250307" y="1529002"/>
-            <a:ext cx="0" cy="1313401"/>
-          </a:xfrm>
-          <a:prstGeom prst="line">
-            <a:avLst/>
-          </a:prstGeom>
-          <a:ln w="38100" cmpd="sng">
-            <a:solidFill>
-              <a:srgbClr val="4D4D4D"/>
-            </a:solidFill>
-          </a:ln>
-        </p:spPr>
-        <p:style>
-          <a:lnRef idx="2">
-            <a:schemeClr val="accent1"/>
-          </a:lnRef>
-          <a:fillRef idx="0">
-            <a:schemeClr val="accent1"/>
-          </a:fillRef>
-          <a:effectRef idx="1">
-            <a:schemeClr val="accent1"/>
-          </a:effectRef>
-          <a:fontRef idx="minor">
-            <a:schemeClr val="tx1"/>
-          </a:fontRef>
-        </p:style>
-      </p:cxnSp>
-      <p:sp>
-        <p:nvSpPr>
-          <p:cNvPr id="28" name="TextBox 27">
-            <a:extLst>
-              <a:ext uri="{FF2B5EF4-FFF2-40B4-BE49-F238E27FC236}">
-                <a16:creationId xmlns:a16="http://schemas.microsoft.com/office/drawing/2014/main" id="{B0ACC797-27DB-4524-8768-4343688BAFE6}"/>
-              </a:ext>
-            </a:extLst>
-          </p:cNvPr>
-          <p:cNvSpPr txBox="1"/>
-          <p:nvPr/>
-        </p:nvSpPr>
-        <p:spPr>
-          <a:xfrm>
-            <a:off x="4283814" y="2326644"/>
-            <a:ext cx="2949497" cy="517028"/>
-          </a:xfrm>
-          <a:prstGeom prst="rect">
-            <a:avLst/>
-          </a:prstGeom>
-          <a:noFill/>
-        </p:spPr>
-        <p:txBody>
-          <a:bodyPr wrap="square" lIns="243791" tIns="91422" rIns="243791" bIns="91422" rtlCol="0">
-            <a:spAutoFit/>
-          </a:bodyPr>
-          <a:lstStyle/>
-          <a:p>
-            <a:pPr algn="ctr">
-              <a:lnSpc>
-                <a:spcPct val="90000"/>
-              </a:lnSpc>
-              <a:spcBef>
-                <a:spcPts val="2134"/>
-              </a:spcBef>
-            </a:pPr>
-            <a:r>
-              <a:rPr lang="en-US" sz="2400" dirty="0">
-                <a:solidFill>
-                  <a:srgbClr val="4D4D4D"/>
-                </a:solidFill>
-                <a:latin typeface="Lato Light"/>
-                <a:cs typeface="Lato Light"/>
-              </a:rPr>
-              <a:t>Printed In Black</a:t>
-            </a:r>
-          </a:p>
-        </p:txBody>
-      </p:sp>
-      <p:sp>
-        <p:nvSpPr>
-          <p:cNvPr id="29" name="TextBox 28">
-            <a:extLst>
-              <a:ext uri="{FF2B5EF4-FFF2-40B4-BE49-F238E27FC236}">
-                <a16:creationId xmlns:a16="http://schemas.microsoft.com/office/drawing/2014/main" id="{2933E93D-41AF-4759-ACD9-37736C2E08DE}"/>
-              </a:ext>
-            </a:extLst>
-          </p:cNvPr>
-          <p:cNvSpPr txBox="1"/>
-          <p:nvPr/>
-        </p:nvSpPr>
-        <p:spPr>
-          <a:xfrm>
-            <a:off x="13991490" y="2332460"/>
-            <a:ext cx="2989165" cy="517028"/>
-          </a:xfrm>
-          <a:prstGeom prst="rect">
-            <a:avLst/>
-          </a:prstGeom>
-          <a:noFill/>
-        </p:spPr>
-        <p:txBody>
-          <a:bodyPr wrap="square" lIns="243791" tIns="91422" rIns="243791" bIns="91422" rtlCol="0">
-            <a:spAutoFit/>
-          </a:bodyPr>
-          <a:lstStyle/>
-          <a:p>
-            <a:pPr algn="ctr">
-              <a:lnSpc>
-                <a:spcPct val="90000"/>
-              </a:lnSpc>
-              <a:spcBef>
-                <a:spcPts val="2134"/>
-              </a:spcBef>
-            </a:pPr>
-            <a:r>
-              <a:rPr lang="en-US" sz="2400" dirty="0">
-                <a:solidFill>
-                  <a:srgbClr val="4D4D4D"/>
-                </a:solidFill>
-                <a:cs typeface="Lato Light"/>
-              </a:rPr>
-              <a:t>Secure Print</a:t>
-            </a:r>
-            <a:endParaRPr lang="en-US" sz="2400" dirty="0">
-              <a:solidFill>
-                <a:srgbClr val="4D4D4D"/>
-              </a:solidFill>
-              <a:latin typeface="Lato Light"/>
-            </a:endParaRPr>
-          </a:p>
-        </p:txBody>
-      </p:sp>
-      <p:sp>
-        <p:nvSpPr>
-          <p:cNvPr id="30" name="TextBox 29">
-            <a:extLst>
-              <a:ext uri="{FF2B5EF4-FFF2-40B4-BE49-F238E27FC236}">
-                <a16:creationId xmlns:a16="http://schemas.microsoft.com/office/drawing/2014/main" id="{9960A0ED-E745-4C9B-95F7-042B4283BC3B}"/>
-              </a:ext>
-            </a:extLst>
-          </p:cNvPr>
-          <p:cNvSpPr txBox="1"/>
-          <p:nvPr/>
-        </p:nvSpPr>
-        <p:spPr>
-          <a:xfrm>
-            <a:off x="21796596" y="2332460"/>
-            <a:ext cx="2016013" cy="517028"/>
-          </a:xfrm>
-          <a:prstGeom prst="rect">
-            <a:avLst/>
-          </a:prstGeom>
-          <a:noFill/>
-        </p:spPr>
-        <p:txBody>
-          <a:bodyPr wrap="square" lIns="243791" tIns="91422" rIns="243791" bIns="91422" rtlCol="0">
-            <a:spAutoFit/>
-          </a:bodyPr>
-          <a:lstStyle/>
-          <a:p>
-            <a:pPr algn="ctr">
-              <a:lnSpc>
-                <a:spcPct val="90000"/>
-              </a:lnSpc>
-              <a:spcBef>
-                <a:spcPts val="2134"/>
-              </a:spcBef>
-            </a:pPr>
-            <a:r>
-              <a:rPr lang="en-US" sz="2400" dirty="0">
-                <a:solidFill>
-                  <a:srgbClr val="4D4D4D"/>
-                </a:solidFill>
-                <a:latin typeface="Lato Light"/>
-                <a:cs typeface="Lato Light"/>
-              </a:rPr>
-              <a:t>Driver Type</a:t>
-            </a:r>
-          </a:p>
-        </p:txBody>
-      </p:sp>
-      <p:sp>
-        <p:nvSpPr>
-          <p:cNvPr id="31" name="TextBox 30">
-            <a:extLst>
-              <a:ext uri="{FF2B5EF4-FFF2-40B4-BE49-F238E27FC236}">
-                <a16:creationId xmlns:a16="http://schemas.microsoft.com/office/drawing/2014/main" id="{5D62C8D9-2965-4F36-8100-0919594BACB6}"/>
-              </a:ext>
-            </a:extLst>
-          </p:cNvPr>
-          <p:cNvSpPr txBox="1"/>
-          <p:nvPr/>
-        </p:nvSpPr>
-        <p:spPr>
-          <a:xfrm>
-            <a:off x="18053205" y="2332460"/>
-            <a:ext cx="2621312" cy="517028"/>
-          </a:xfrm>
-          <a:prstGeom prst="rect">
-            <a:avLst/>
-          </a:prstGeom>
-          <a:noFill/>
-        </p:spPr>
-        <p:txBody>
-          <a:bodyPr wrap="square" lIns="243791" tIns="91422" rIns="243791" bIns="91422" rtlCol="0">
-            <a:spAutoFit/>
-          </a:bodyPr>
-          <a:lstStyle/>
-          <a:p>
-            <a:pPr algn="ctr">
-              <a:lnSpc>
-                <a:spcPct val="90000"/>
-              </a:lnSpc>
-              <a:spcBef>
-                <a:spcPts val="2134"/>
-              </a:spcBef>
-            </a:pPr>
-            <a:r>
-              <a:rPr lang="en-US" sz="2400" dirty="0">
-                <a:solidFill>
-                  <a:srgbClr val="4D4D4D"/>
-                </a:solidFill>
-                <a:latin typeface="Lato Light"/>
-                <a:cs typeface="Lato Light"/>
-              </a:rPr>
-              <a:t>Job States</a:t>
-            </a:r>
-          </a:p>
-        </p:txBody>
-      </p:sp>
-    </p:spTree>
-    <p:extLst>
-      <p:ext uri="{BB962C8B-B14F-4D97-AF65-F5344CB8AC3E}">
-        <p14:creationId xmlns:p14="http://schemas.microsoft.com/office/powerpoint/2010/main" val="3213131689"/>
       </p:ext>
     </p:extLst>
   </p:cSld>

</xml_diff>